<commit_message>
deleted svm page in slides
</commit_message>
<xml_diff>
--- a/project_presentation.pptx
+++ b/project_presentation.pptx
@@ -5,7 +5,7 @@
     <p:sldMasterId id="2147483648" r:id="rId1"/>
   </p:sldMasterIdLst>
   <p:notesMasterIdLst>
-    <p:notesMasterId r:id="rId14"/>
+    <p:notesMasterId r:id="rId13"/>
   </p:notesMasterIdLst>
   <p:sldIdLst>
     <p:sldId id="256" r:id="rId2"/>
@@ -14,12 +14,11 @@
     <p:sldId id="259" r:id="rId5"/>
     <p:sldId id="260" r:id="rId6"/>
     <p:sldId id="258" r:id="rId7"/>
-    <p:sldId id="261" r:id="rId8"/>
-    <p:sldId id="262" r:id="rId9"/>
-    <p:sldId id="263" r:id="rId10"/>
-    <p:sldId id="264" r:id="rId11"/>
-    <p:sldId id="266" r:id="rId12"/>
-    <p:sldId id="270" r:id="rId13"/>
+    <p:sldId id="262" r:id="rId8"/>
+    <p:sldId id="263" r:id="rId9"/>
+    <p:sldId id="264" r:id="rId10"/>
+    <p:sldId id="266" r:id="rId11"/>
+    <p:sldId id="270" r:id="rId12"/>
   </p:sldIdLst>
   <p:sldSz cx="9144000" cy="6858000" type="screen4x3"/>
   <p:notesSz cx="6858000" cy="9144000"/>
@@ -204,7 +203,7 @@
             <a:fld id="{3EF55D68-0A8E-479A-BA10-A8524331EA6C}" type="datetimeFigureOut">
               <a:rPr lang="en-US" smtClean="0"/>
               <a:pPr/>
-              <a:t>12/6/12</a:t>
+              <a:t>12/7/2012</a:t>
             </a:fld>
             <a:endParaRPr lang="en-US"/>
           </a:p>
@@ -375,7 +374,7 @@
     </p:spTree>
     <p:extLst>
       <p:ext uri="{BB962C8B-B14F-4D97-AF65-F5344CB8AC3E}">
-        <p14:creationId xmlns:p14="http://schemas.microsoft.com/office/powerpoint/2010/main" val="2985717041"/>
+        <p14:creationId xmlns:p14="http://schemas.microsoft.com/office/powerpoint/2010/main" xmlns="" val="2985717041"/>
       </p:ext>
     </p:extLst>
   </p:cSld>
@@ -657,7 +656,7 @@
             <a:fld id="{CB01A329-8325-4D64-A6E2-DCA93D836D8B}" type="datetimeFigureOut">
               <a:rPr lang="en-US" smtClean="0"/>
               <a:pPr/>
-              <a:t>12/6/12</a:t>
+              <a:t>12/7/2012</a:t>
             </a:fld>
             <a:endParaRPr lang="en-US"/>
           </a:p>
@@ -824,7 +823,7 @@
             <a:fld id="{CB01A329-8325-4D64-A6E2-DCA93D836D8B}" type="datetimeFigureOut">
               <a:rPr lang="en-US" smtClean="0"/>
               <a:pPr/>
-              <a:t>12/6/12</a:t>
+              <a:t>12/7/2012</a:t>
             </a:fld>
             <a:endParaRPr lang="en-US"/>
           </a:p>
@@ -1001,7 +1000,7 @@
             <a:fld id="{CB01A329-8325-4D64-A6E2-DCA93D836D8B}" type="datetimeFigureOut">
               <a:rPr lang="en-US" smtClean="0"/>
               <a:pPr/>
-              <a:t>12/6/12</a:t>
+              <a:t>12/7/2012</a:t>
             </a:fld>
             <a:endParaRPr lang="en-US"/>
           </a:p>
@@ -1168,7 +1167,7 @@
             <a:fld id="{CB01A329-8325-4D64-A6E2-DCA93D836D8B}" type="datetimeFigureOut">
               <a:rPr lang="en-US" smtClean="0"/>
               <a:pPr/>
-              <a:t>12/6/12</a:t>
+              <a:t>12/7/2012</a:t>
             </a:fld>
             <a:endParaRPr lang="en-US"/>
           </a:p>
@@ -1411,7 +1410,7 @@
             <a:fld id="{CB01A329-8325-4D64-A6E2-DCA93D836D8B}" type="datetimeFigureOut">
               <a:rPr lang="en-US" smtClean="0"/>
               <a:pPr/>
-              <a:t>12/6/12</a:t>
+              <a:t>12/7/2012</a:t>
             </a:fld>
             <a:endParaRPr lang="en-US"/>
           </a:p>
@@ -1696,7 +1695,7 @@
             <a:fld id="{CB01A329-8325-4D64-A6E2-DCA93D836D8B}" type="datetimeFigureOut">
               <a:rPr lang="en-US" smtClean="0"/>
               <a:pPr/>
-              <a:t>12/6/12</a:t>
+              <a:t>12/7/2012</a:t>
             </a:fld>
             <a:endParaRPr lang="en-US"/>
           </a:p>
@@ -2115,7 +2114,7 @@
             <a:fld id="{CB01A329-8325-4D64-A6E2-DCA93D836D8B}" type="datetimeFigureOut">
               <a:rPr lang="en-US" smtClean="0"/>
               <a:pPr/>
-              <a:t>12/6/12</a:t>
+              <a:t>12/7/2012</a:t>
             </a:fld>
             <a:endParaRPr lang="en-US"/>
           </a:p>
@@ -2230,7 +2229,7 @@
             <a:fld id="{CB01A329-8325-4D64-A6E2-DCA93D836D8B}" type="datetimeFigureOut">
               <a:rPr lang="en-US" smtClean="0"/>
               <a:pPr/>
-              <a:t>12/6/12</a:t>
+              <a:t>12/7/2012</a:t>
             </a:fld>
             <a:endParaRPr lang="en-US"/>
           </a:p>
@@ -2322,7 +2321,7 @@
             <a:fld id="{CB01A329-8325-4D64-A6E2-DCA93D836D8B}" type="datetimeFigureOut">
               <a:rPr lang="en-US" smtClean="0"/>
               <a:pPr/>
-              <a:t>12/6/12</a:t>
+              <a:t>12/7/2012</a:t>
             </a:fld>
             <a:endParaRPr lang="en-US"/>
           </a:p>
@@ -2596,7 +2595,7 @@
             <a:fld id="{CB01A329-8325-4D64-A6E2-DCA93D836D8B}" type="datetimeFigureOut">
               <a:rPr lang="en-US" smtClean="0"/>
               <a:pPr/>
-              <a:t>12/6/12</a:t>
+              <a:t>12/7/2012</a:t>
             </a:fld>
             <a:endParaRPr lang="en-US"/>
           </a:p>
@@ -2846,7 +2845,7 @@
             <a:fld id="{CB01A329-8325-4D64-A6E2-DCA93D836D8B}" type="datetimeFigureOut">
               <a:rPr lang="en-US" smtClean="0"/>
               <a:pPr/>
-              <a:t>12/6/12</a:t>
+              <a:t>12/7/2012</a:t>
             </a:fld>
             <a:endParaRPr lang="en-US"/>
           </a:p>
@@ -3056,7 +3055,7 @@
             <a:fld id="{CB01A329-8325-4D64-A6E2-DCA93D836D8B}" type="datetimeFigureOut">
               <a:rPr lang="en-US" smtClean="0"/>
               <a:pPr/>
-              <a:t>12/6/12</a:t>
+              <a:t>12/7/2012</a:t>
             </a:fld>
             <a:endParaRPr lang="en-US"/>
           </a:p>
@@ -3556,7 +3555,7 @@
   <p:timing>
     <p:tnLst>
       <p:par>
-        <p:cTn xmlns:p14="http://schemas.microsoft.com/office/powerpoint/2010/main" id="1" dur="indefinite" restart="never" nodeType="tmRoot"/>
+        <p:cTn id="1" dur="indefinite" restart="never" nodeType="tmRoot"/>
       </p:par>
     </p:tnLst>
   </p:timing>
@@ -3598,7 +3597,7 @@
             <a:pPr algn="l"/>
             <a:r>
               <a:rPr lang="en-US" dirty="0" smtClean="0"/>
-              <a:t>Discussion and Conclusion</a:t>
+              <a:t>References</a:t>
             </a:r>
             <a:endParaRPr lang="en-US" dirty="0"/>
           </a:p>
@@ -3617,34 +3616,176 @@
         <p:spPr/>
         <p:txBody>
           <a:bodyPr>
-            <a:normAutofit lnSpcReduction="10000"/>
+            <a:noAutofit/>
           </a:bodyPr>
           <a:lstStyle/>
           <a:p>
-            <a:r>
-              <a:rPr lang="en-US" dirty="0" smtClean="0"/>
-              <a:t>The model can predicts whether the paper is published in ACL or not with good accuracy.</a:t>
-            </a:r>
-            <a:endParaRPr lang="en-US" dirty="0" smtClean="0"/>
-          </a:p>
-          <a:p>
-            <a:r>
-              <a:rPr lang="en-US" dirty="0" smtClean="0"/>
-              <a:t>The metadata and the topic distribution learned by LDA model are the best features.</a:t>
-            </a:r>
-          </a:p>
-          <a:p>
-            <a:r>
-              <a:rPr lang="en-US" dirty="0" smtClean="0"/>
-              <a:t>It seems that the model works better on a more balanced dataset than on a less balanced one.</a:t>
-            </a:r>
-          </a:p>
-          <a:p>
-            <a:r>
-              <a:rPr lang="en-US" dirty="0" smtClean="0"/>
-              <a:t>We plan to study how the topic/style of papers changes over the time. </a:t>
-            </a:r>
-            <a:endParaRPr lang="en-US" dirty="0"/>
+            <a:pPr>
+              <a:buNone/>
+            </a:pPr>
+            <a:r>
+              <a:rPr lang="en-US" sz="2400" dirty="0" smtClean="0"/>
+              <a:t>[</a:t>
+            </a:r>
+            <a:r>
+              <a:rPr lang="en-US" sz="2400" dirty="0"/>
+              <a:t>1] Apache </a:t>
+            </a:r>
+            <a:r>
+              <a:rPr lang="en-US" sz="2400" dirty="0" err="1"/>
+              <a:t>Tika</a:t>
+            </a:r>
+            <a:r>
+              <a:rPr lang="en-US" sz="2400" dirty="0"/>
+              <a:t>, http://</a:t>
+            </a:r>
+            <a:r>
+              <a:rPr lang="en-US" sz="2400" dirty="0" err="1"/>
+              <a:t>tika.apache.org</a:t>
+            </a:r>
+            <a:r>
+              <a:rPr lang="en-US" sz="2400" dirty="0"/>
+              <a:t>/</a:t>
+            </a:r>
+          </a:p>
+          <a:p>
+            <a:pPr>
+              <a:buNone/>
+            </a:pPr>
+            <a:r>
+              <a:rPr lang="en-US" sz="2400" dirty="0"/>
+              <a:t>[2] </a:t>
+            </a:r>
+            <a:r>
+              <a:rPr lang="en-US" sz="2400" dirty="0" err="1"/>
+              <a:t>iText</a:t>
+            </a:r>
+            <a:r>
+              <a:rPr lang="en-US" sz="2400" dirty="0"/>
+              <a:t>, http://</a:t>
+            </a:r>
+            <a:r>
+              <a:rPr lang="en-US" sz="2400" dirty="0" err="1"/>
+              <a:t>itextpdf.com</a:t>
+            </a:r>
+            <a:r>
+              <a:rPr lang="en-US" sz="2400" dirty="0"/>
+              <a:t>/</a:t>
+            </a:r>
+          </a:p>
+          <a:p>
+            <a:pPr>
+              <a:buNone/>
+            </a:pPr>
+            <a:r>
+              <a:rPr lang="en-US" sz="2400" dirty="0"/>
+              <a:t>[3] D. M. </a:t>
+            </a:r>
+            <a:r>
+              <a:rPr lang="en-US" sz="2400" dirty="0" err="1"/>
+              <a:t>Blei</a:t>
+            </a:r>
+            <a:r>
+              <a:rPr lang="en-US" sz="2400" dirty="0"/>
+              <a:t>, A. Y. Ng, and M. I. Jordan. Latent </a:t>
+            </a:r>
+            <a:r>
+              <a:rPr lang="en-US" sz="2400" dirty="0" err="1"/>
+              <a:t>dirichlet</a:t>
+            </a:r>
+            <a:r>
+              <a:rPr lang="en-US" sz="2400" dirty="0"/>
+              <a:t> allocation. J. Mach. Learn. Res., 3:993</a:t>
+            </a:r>
+            <a:r>
+              <a:rPr lang="en-US" sz="2400" dirty="0" smtClean="0"/>
+              <a:t>–1022</a:t>
+            </a:r>
+            <a:r>
+              <a:rPr lang="en-US" sz="2400" dirty="0"/>
+              <a:t>, Mar. 2003.</a:t>
+            </a:r>
+          </a:p>
+          <a:p>
+            <a:pPr>
+              <a:buNone/>
+            </a:pPr>
+            <a:r>
+              <a:rPr lang="en-US" sz="2400" dirty="0" smtClean="0"/>
+              <a:t>[</a:t>
+            </a:r>
+            <a:r>
+              <a:rPr lang="en-US" sz="2400" dirty="0"/>
+              <a:t>4</a:t>
+            </a:r>
+            <a:r>
+              <a:rPr lang="en-US" sz="2400" dirty="0" smtClean="0"/>
+              <a:t>]</a:t>
+            </a:r>
+            <a:r>
+              <a:rPr lang="en-US" sz="2400" dirty="0"/>
+              <a:t>http://</a:t>
+            </a:r>
+            <a:r>
+              <a:rPr lang="en-US" sz="2400" dirty="0" err="1"/>
+              <a:t>academic.research.microsoft.com</a:t>
+            </a:r>
+            <a:r>
+              <a:rPr lang="en-US" sz="2400" dirty="0"/>
+              <a:t>/</a:t>
+            </a:r>
+            <a:r>
+              <a:rPr lang="en-US" sz="2400" dirty="0" err="1"/>
+              <a:t>RankList?entitytype</a:t>
+            </a:r>
+            <a:r>
+              <a:rPr lang="en-US" sz="2400" dirty="0"/>
+              <a:t>=2&amp;topDomainID=2&amp;subDomainID=</a:t>
+            </a:r>
+            <a:r>
+              <a:rPr lang="en-US" sz="2400" dirty="0" smtClean="0"/>
+              <a:t>9</a:t>
+            </a:r>
+          </a:p>
+          <a:p>
+            <a:pPr>
+              <a:buNone/>
+            </a:pPr>
+            <a:r>
+              <a:rPr lang="en-US" sz="2400" dirty="0"/>
+              <a:t>[5] Carven von </a:t>
+            </a:r>
+            <a:r>
+              <a:rPr lang="en-US" sz="2400" dirty="0" err="1" smtClean="0"/>
+              <a:t>Bearnensquash</a:t>
+            </a:r>
+            <a:r>
+              <a:rPr lang="en-US" sz="2400" dirty="0" smtClean="0"/>
+              <a:t>  Paper </a:t>
+            </a:r>
+            <a:r>
+              <a:rPr lang="en-US" sz="2400" dirty="0"/>
+              <a:t>Gestalt http://</a:t>
+            </a:r>
+            <a:r>
+              <a:rPr lang="en-US" sz="2400" dirty="0" err="1"/>
+              <a:t>vision.ucsd.edu</a:t>
+            </a:r>
+            <a:r>
+              <a:rPr lang="en-US" sz="2400" dirty="0"/>
+              <a:t>/sites/default/files/</a:t>
+            </a:r>
+            <a:r>
+              <a:rPr lang="en-US" sz="2400" dirty="0" err="1"/>
+              <a:t>gestalt.pdf</a:t>
+            </a:r>
+            <a:endParaRPr lang="en-US" sz="2400" dirty="0"/>
+          </a:p>
+          <a:p>
+            <a:pPr>
+              <a:buNone/>
+            </a:pPr>
+            <a:endParaRPr lang="en-US" sz="2400" dirty="0"/>
           </a:p>
         </p:txBody>
       </p:sp>
@@ -3656,7 +3797,7 @@
   <p:timing>
     <p:tnLst>
       <p:par>
-        <p:cTn xmlns:p14="http://schemas.microsoft.com/office/powerpoint/2010/main" id="1" dur="indefinite" restart="never" nodeType="tmRoot"/>
+        <p:cTn id="1" dur="indefinite" restart="never" nodeType="tmRoot"/>
       </p:par>
     </p:tnLst>
   </p:timing>
@@ -3687,248 +3828,6 @@
             <a:spLocks noGrp="1"/>
           </p:cNvSpPr>
           <p:nvPr>
-            <p:ph type="title"/>
-          </p:nvPr>
-        </p:nvSpPr>
-        <p:spPr/>
-        <p:txBody>
-          <a:bodyPr/>
-          <a:lstStyle/>
-          <a:p>
-            <a:pPr algn="l"/>
-            <a:r>
-              <a:rPr lang="en-US" dirty="0" smtClean="0"/>
-              <a:t>References</a:t>
-            </a:r>
-            <a:endParaRPr lang="en-US" dirty="0"/>
-          </a:p>
-        </p:txBody>
-      </p:sp>
-      <p:sp>
-        <p:nvSpPr>
-          <p:cNvPr id="3" name="Content Placeholder 2"/>
-          <p:cNvSpPr>
-            <a:spLocks noGrp="1"/>
-          </p:cNvSpPr>
-          <p:nvPr>
-            <p:ph idx="1"/>
-          </p:nvPr>
-        </p:nvSpPr>
-        <p:spPr/>
-        <p:txBody>
-          <a:bodyPr>
-            <a:noAutofit/>
-          </a:bodyPr>
-          <a:lstStyle/>
-          <a:p>
-            <a:pPr>
-              <a:buNone/>
-            </a:pPr>
-            <a:r>
-              <a:rPr lang="en-US" sz="2400" dirty="0" smtClean="0"/>
-              <a:t>[</a:t>
-            </a:r>
-            <a:r>
-              <a:rPr lang="en-US" sz="2400" dirty="0"/>
-              <a:t>1] Apache </a:t>
-            </a:r>
-            <a:r>
-              <a:rPr lang="en-US" sz="2400" dirty="0" err="1"/>
-              <a:t>Tika</a:t>
-            </a:r>
-            <a:r>
-              <a:rPr lang="en-US" sz="2400" dirty="0"/>
-              <a:t>, http://</a:t>
-            </a:r>
-            <a:r>
-              <a:rPr lang="en-US" sz="2400" dirty="0" err="1"/>
-              <a:t>tika.apache.org</a:t>
-            </a:r>
-            <a:r>
-              <a:rPr lang="en-US" sz="2400" dirty="0"/>
-              <a:t>/</a:t>
-            </a:r>
-          </a:p>
-          <a:p>
-            <a:pPr>
-              <a:buNone/>
-            </a:pPr>
-            <a:r>
-              <a:rPr lang="en-US" sz="2400" dirty="0"/>
-              <a:t>[2] </a:t>
-            </a:r>
-            <a:r>
-              <a:rPr lang="en-US" sz="2400" dirty="0" err="1"/>
-              <a:t>iText</a:t>
-            </a:r>
-            <a:r>
-              <a:rPr lang="en-US" sz="2400" dirty="0"/>
-              <a:t>, http://</a:t>
-            </a:r>
-            <a:r>
-              <a:rPr lang="en-US" sz="2400" dirty="0" err="1"/>
-              <a:t>itextpdf.com</a:t>
-            </a:r>
-            <a:r>
-              <a:rPr lang="en-US" sz="2400" dirty="0"/>
-              <a:t>/</a:t>
-            </a:r>
-          </a:p>
-          <a:p>
-            <a:pPr>
-              <a:buNone/>
-            </a:pPr>
-            <a:r>
-              <a:rPr lang="en-US" sz="2400" dirty="0"/>
-              <a:t>[3] D. M. </a:t>
-            </a:r>
-            <a:r>
-              <a:rPr lang="en-US" sz="2400" dirty="0" err="1"/>
-              <a:t>Blei</a:t>
-            </a:r>
-            <a:r>
-              <a:rPr lang="en-US" sz="2400" dirty="0"/>
-              <a:t>, A. Y. Ng, and M. I. Jordan. Latent </a:t>
-            </a:r>
-            <a:r>
-              <a:rPr lang="en-US" sz="2400" dirty="0" err="1"/>
-              <a:t>dirichlet</a:t>
-            </a:r>
-            <a:r>
-              <a:rPr lang="en-US" sz="2400" dirty="0"/>
-              <a:t> allocation. J. Mach. Learn. Res., 3:993</a:t>
-            </a:r>
-            <a:r>
-              <a:rPr lang="en-US" sz="2400" dirty="0" smtClean="0"/>
-              <a:t>–1022</a:t>
-            </a:r>
-            <a:r>
-              <a:rPr lang="en-US" sz="2400" dirty="0"/>
-              <a:t>, Mar. 2003.</a:t>
-            </a:r>
-          </a:p>
-          <a:p>
-            <a:pPr>
-              <a:buNone/>
-            </a:pPr>
-            <a:r>
-              <a:rPr lang="en-US" sz="2400" dirty="0" smtClean="0"/>
-              <a:t>[</a:t>
-            </a:r>
-            <a:r>
-              <a:rPr lang="en-US" sz="2400" dirty="0"/>
-              <a:t>4</a:t>
-            </a:r>
-            <a:r>
-              <a:rPr lang="en-US" sz="2400" dirty="0" smtClean="0"/>
-              <a:t>]</a:t>
-            </a:r>
-            <a:r>
-              <a:rPr lang="en-US" sz="2400" dirty="0"/>
-              <a:t>http://</a:t>
-            </a:r>
-            <a:r>
-              <a:rPr lang="en-US" sz="2400" dirty="0" err="1"/>
-              <a:t>academic.research.microsoft.com</a:t>
-            </a:r>
-            <a:r>
-              <a:rPr lang="en-US" sz="2400" dirty="0"/>
-              <a:t>/</a:t>
-            </a:r>
-            <a:r>
-              <a:rPr lang="en-US" sz="2400" dirty="0" err="1"/>
-              <a:t>RankList?entitytype</a:t>
-            </a:r>
-            <a:r>
-              <a:rPr lang="en-US" sz="2400" dirty="0"/>
-              <a:t>=2&amp;topDomainID=2&amp;subDomainID=</a:t>
-            </a:r>
-            <a:r>
-              <a:rPr lang="en-US" sz="2400" dirty="0" smtClean="0"/>
-              <a:t>9</a:t>
-            </a:r>
-          </a:p>
-          <a:p>
-            <a:pPr>
-              <a:buNone/>
-            </a:pPr>
-            <a:r>
-              <a:rPr lang="en-US" sz="2400" dirty="0"/>
-              <a:t>[5] Carven von </a:t>
-            </a:r>
-            <a:r>
-              <a:rPr lang="en-US" sz="2400" dirty="0" err="1" smtClean="0"/>
-              <a:t>Bearnensquash</a:t>
-            </a:r>
-            <a:r>
-              <a:rPr lang="en-US" sz="2400" dirty="0" smtClean="0"/>
-              <a:t>  Paper </a:t>
-            </a:r>
-            <a:r>
-              <a:rPr lang="en-US" sz="2400" dirty="0"/>
-              <a:t>Gestalt http://</a:t>
-            </a:r>
-            <a:r>
-              <a:rPr lang="en-US" sz="2400" dirty="0" err="1"/>
-              <a:t>vision.ucsd.edu</a:t>
-            </a:r>
-            <a:r>
-              <a:rPr lang="en-US" sz="2400" dirty="0"/>
-              <a:t>/sites/default/files/</a:t>
-            </a:r>
-            <a:r>
-              <a:rPr lang="en-US" sz="2400" dirty="0" err="1"/>
-              <a:t>gestalt.pdf</a:t>
-            </a:r>
-            <a:endParaRPr lang="en-US" sz="2400" dirty="0"/>
-          </a:p>
-          <a:p>
-            <a:pPr>
-              <a:buNone/>
-            </a:pPr>
-            <a:endParaRPr lang="en-US" sz="2400" dirty="0"/>
-          </a:p>
-        </p:txBody>
-      </p:sp>
-    </p:spTree>
-  </p:cSld>
-  <p:clrMapOvr>
-    <a:masterClrMapping/>
-  </p:clrMapOvr>
-  <p:timing>
-    <p:tnLst>
-      <p:par>
-        <p:cTn xmlns:p14="http://schemas.microsoft.com/office/powerpoint/2010/main" id="1" dur="indefinite" restart="never" nodeType="tmRoot"/>
-      </p:par>
-    </p:tnLst>
-  </p:timing>
-</p:sld>
-</file>
-
-<file path=ppt/slides/slide12.xml><?xml version="1.0" encoding="utf-8"?>
-<p:sld xmlns:a="http://schemas.openxmlformats.org/drawingml/2006/main" xmlns:r="http://schemas.openxmlformats.org/officeDocument/2006/relationships" xmlns:p="http://schemas.openxmlformats.org/presentationml/2006/main">
-  <p:cSld>
-    <p:spTree>
-      <p:nvGrpSpPr>
-        <p:cNvPr id="1" name=""/>
-        <p:cNvGrpSpPr/>
-        <p:nvPr/>
-      </p:nvGrpSpPr>
-      <p:grpSpPr>
-        <a:xfrm>
-          <a:off x="0" y="0"/>
-          <a:ext cx="0" cy="0"/>
-          <a:chOff x="0" y="0"/>
-          <a:chExt cx="0" cy="0"/>
-        </a:xfrm>
-      </p:grpSpPr>
-      <p:sp>
-        <p:nvSpPr>
-          <p:cNvPr id="2" name="Title 1"/>
-          <p:cNvSpPr>
-            <a:spLocks noGrp="1"/>
-          </p:cNvSpPr>
-          <p:nvPr>
             <p:ph type="ctrTitle"/>
           </p:nvPr>
         </p:nvSpPr>
@@ -3967,7 +3866,7 @@
     </p:spTree>
     <p:extLst>
       <p:ext uri="{BB962C8B-B14F-4D97-AF65-F5344CB8AC3E}">
-        <p14:creationId xmlns:p14="http://schemas.microsoft.com/office/powerpoint/2010/main" val="1491979582"/>
+        <p14:creationId xmlns:p14="http://schemas.microsoft.com/office/powerpoint/2010/main" xmlns="" val="1491979582"/>
       </p:ext>
     </p:extLst>
   </p:cSld>
@@ -4087,7 +3986,7 @@
   <p:timing>
     <p:tnLst>
       <p:par>
-        <p:cTn xmlns:p14="http://schemas.microsoft.com/office/powerpoint/2010/main" id="1" dur="indefinite" restart="never" nodeType="tmRoot"/>
+        <p:cTn id="1" dur="indefinite" restart="never" nodeType="tmRoot"/>
       </p:par>
     </p:tnLst>
   </p:timing>
@@ -4166,7 +4065,7 @@
   <p:timing>
     <p:tnLst>
       <p:par>
-        <p:cTn xmlns:p14="http://schemas.microsoft.com/office/powerpoint/2010/main" id="1" dur="indefinite" restart="never" nodeType="tmRoot"/>
+        <p:cTn id="1" dur="indefinite" restart="never" nodeType="tmRoot"/>
       </p:par>
     </p:tnLst>
   </p:timing>
@@ -4286,7 +4185,7 @@
   <p:timing>
     <p:tnLst>
       <p:par>
-        <p:cTn xmlns:p14="http://schemas.microsoft.com/office/powerpoint/2010/main" id="1" dur="indefinite" restart="never" nodeType="tmRoot"/>
+        <p:cTn id="1" dur="indefinite" restart="never" nodeType="tmRoot"/>
       </p:par>
     </p:tnLst>
   </p:timing>
@@ -4358,11 +4257,7 @@
           <a:p>
             <a:r>
               <a:rPr lang="en-US" dirty="0" smtClean="0"/>
-              <a:t>Popular techniques mentioned in the </a:t>
-            </a:r>
-            <a:r>
-              <a:rPr lang="en-US" dirty="0" smtClean="0"/>
-              <a:t>paper</a:t>
+              <a:t>Popular techniques mentioned in the paper</a:t>
             </a:r>
           </a:p>
           <a:p>
@@ -4403,7 +4298,6 @@
               <a:rPr lang="en-US" dirty="0" smtClean="0"/>
               <a:t>)</a:t>
             </a:r>
-            <a:endParaRPr lang="en-US" dirty="0" smtClean="0"/>
           </a:p>
           <a:p>
             <a:endParaRPr lang="en-US" dirty="0"/>
@@ -4448,7 +4342,7 @@
   <p:timing>
     <p:tnLst>
       <p:par>
-        <p:cTn xmlns:p14="http://schemas.microsoft.com/office/powerpoint/2010/main" id="1" dur="indefinite" restart="never" nodeType="tmRoot"/>
+        <p:cTn id="1" dur="indefinite" restart="never" nodeType="tmRoot"/>
       </p:par>
     </p:tnLst>
   </p:timing>
@@ -4568,7 +4462,7 @@
           <p:nvPr>
             <p:extLst>
               <p:ext uri="{D42A27DB-BD31-4B8C-83A1-F6EECF244321}">
-                <p14:modId xmlns:p14="http://schemas.microsoft.com/office/powerpoint/2010/main" val="3173376732"/>
+                <p14:modId xmlns:p14="http://schemas.microsoft.com/office/powerpoint/2010/main" xmlns="" val="3173376732"/>
               </p:ext>
             </p:extLst>
           </p:nvPr>
@@ -4911,7 +4805,7 @@
   <p:timing>
     <p:tnLst>
       <p:par>
-        <p:cTn xmlns:p14="http://schemas.microsoft.com/office/powerpoint/2010/main" id="1" dur="indefinite" restart="never" nodeType="tmRoot"/>
+        <p:cTn id="1" dur="indefinite" restart="never" nodeType="tmRoot"/>
       </p:par>
     </p:tnLst>
   </p:timing>
@@ -4947,47 +4841,1518 @@
         </p:nvSpPr>
         <p:spPr/>
         <p:txBody>
-          <a:bodyPr/>
+          <a:bodyPr>
+            <a:normAutofit/>
+          </a:bodyPr>
           <a:lstStyle/>
           <a:p>
             <a:pPr algn="l"/>
             <a:r>
               <a:rPr lang="en-US" dirty="0" smtClean="0"/>
-              <a:t>Classifier</a:t>
+              <a:t>Evaluation (ACL 2012</a:t>
+            </a:r>
+            <a:r>
+              <a:rPr lang="en-US" dirty="0" smtClean="0"/>
+              <a:t>) </a:t>
+            </a:r>
+            <a:r>
+              <a:rPr lang="en-US" dirty="0" smtClean="0"/>
+              <a:t>– SVM</a:t>
             </a:r>
             <a:endParaRPr lang="en-US" dirty="0"/>
           </a:p>
         </p:txBody>
       </p:sp>
-      <p:sp>
-        <p:nvSpPr>
-          <p:cNvPr id="3" name="Content Placeholder 2"/>
-          <p:cNvSpPr>
-            <a:spLocks noGrp="1"/>
-          </p:cNvSpPr>
+      <p:graphicFrame>
+        <p:nvGraphicFramePr>
+          <p:cNvPr id="6" name="Content Placeholder 5"/>
+          <p:cNvGraphicFramePr>
+            <a:graphicFrameLocks noGrp="1"/>
+          </p:cNvGraphicFramePr>
           <p:nvPr>
             <p:ph idx="1"/>
-          </p:nvPr>
-        </p:nvSpPr>
-        <p:spPr/>
-        <p:txBody>
-          <a:bodyPr/>
-          <a:lstStyle/>
-          <a:p>
-            <a:r>
-              <a:rPr lang="en-US" dirty="0" smtClean="0"/>
-              <a:t>We classify the samples by the SVM classifier.  </a:t>
-            </a:r>
-          </a:p>
-          <a:p>
-            <a:r>
-              <a:rPr lang="en-US" dirty="0" smtClean="0"/>
-              <a:t>For the implementation, we are using a java version of LIBSVM.</a:t>
-            </a:r>
-            <a:endParaRPr lang="en-US" dirty="0"/>
-          </a:p>
-        </p:txBody>
-      </p:sp>
+            <p:extLst>
+              <p:ext uri="{D42A27DB-BD31-4B8C-83A1-F6EECF244321}">
+                <p14:modId xmlns:p14="http://schemas.microsoft.com/office/powerpoint/2010/main" xmlns="" val="2884715640"/>
+              </p:ext>
+            </p:extLst>
+          </p:nvPr>
+        </p:nvGraphicFramePr>
+        <p:xfrm>
+          <a:off x="381000" y="1371600"/>
+          <a:ext cx="8305800" cy="5047488"/>
+        </p:xfrm>
+        <a:graphic>
+          <a:graphicData uri="http://schemas.openxmlformats.org/drawingml/2006/table">
+            <a:tbl>
+              <a:tblPr firstRow="1" bandRow="1">
+                <a:tableStyleId>{5C22544A-7EE6-4342-B048-85BDC9FD1C3A}</a:tableStyleId>
+              </a:tblPr>
+              <a:tblGrid>
+                <a:gridCol w="2286000"/>
+                <a:gridCol w="1866900"/>
+                <a:gridCol w="2076450"/>
+                <a:gridCol w="2076450"/>
+              </a:tblGrid>
+              <a:tr h="370840">
+                <a:tc>
+                  <a:txBody>
+                    <a:bodyPr/>
+                    <a:lstStyle/>
+                    <a:p>
+                      <a:pPr marL="0" marR="0" algn="ctr">
+                        <a:lnSpc>
+                          <a:spcPct val="115000"/>
+                        </a:lnSpc>
+                        <a:spcBef>
+                          <a:spcPts val="0"/>
+                        </a:spcBef>
+                        <a:spcAft>
+                          <a:spcPts val="1000"/>
+                        </a:spcAft>
+                      </a:pPr>
+                      <a:r>
+                        <a:rPr lang="en-US" sz="2400" b="1" dirty="0">
+                          <a:effectLst/>
+                          <a:latin typeface="Cambria"/>
+                          <a:ea typeface="ＭＳ 明朝"/>
+                          <a:cs typeface="Times New Roman"/>
+                        </a:rPr>
+                        <a:t> </a:t>
+                      </a:r>
+                      <a:endParaRPr lang="en-US" sz="2400" dirty="0">
+                        <a:effectLst/>
+                        <a:latin typeface="Cambria"/>
+                        <a:ea typeface="ＭＳ 明朝"/>
+                        <a:cs typeface="Times New Roman"/>
+                      </a:endParaRPr>
+                    </a:p>
+                  </a:txBody>
+                  <a:tcPr marL="68580" marR="68580" marT="0" marB="0"/>
+                </a:tc>
+                <a:tc>
+                  <a:txBody>
+                    <a:bodyPr/>
+                    <a:lstStyle/>
+                    <a:p>
+                      <a:pPr marL="0" marR="0" algn="ctr">
+                        <a:lnSpc>
+                          <a:spcPct val="115000"/>
+                        </a:lnSpc>
+                        <a:spcBef>
+                          <a:spcPts val="0"/>
+                        </a:spcBef>
+                        <a:spcAft>
+                          <a:spcPts val="1000"/>
+                        </a:spcAft>
+                      </a:pPr>
+                      <a:r>
+                        <a:rPr lang="en-US" sz="2400" b="1" dirty="0">
+                          <a:effectLst/>
+                          <a:latin typeface="Cambria"/>
+                          <a:ea typeface="ＭＳ 明朝"/>
+                          <a:cs typeface="Times New Roman"/>
+                        </a:rPr>
+                        <a:t>Precision</a:t>
+                      </a:r>
+                      <a:endParaRPr lang="en-US" sz="2400" dirty="0">
+                        <a:effectLst/>
+                        <a:latin typeface="Cambria"/>
+                        <a:ea typeface="ＭＳ 明朝"/>
+                        <a:cs typeface="Times New Roman"/>
+                      </a:endParaRPr>
+                    </a:p>
+                  </a:txBody>
+                  <a:tcPr marL="68580" marR="68580" marT="0" marB="0"/>
+                </a:tc>
+                <a:tc>
+                  <a:txBody>
+                    <a:bodyPr/>
+                    <a:lstStyle/>
+                    <a:p>
+                      <a:pPr marL="0" marR="0" algn="ctr">
+                        <a:lnSpc>
+                          <a:spcPct val="115000"/>
+                        </a:lnSpc>
+                        <a:spcBef>
+                          <a:spcPts val="0"/>
+                        </a:spcBef>
+                        <a:spcAft>
+                          <a:spcPts val="1000"/>
+                        </a:spcAft>
+                      </a:pPr>
+                      <a:r>
+                        <a:rPr lang="en-US" sz="2400" b="1" dirty="0">
+                          <a:effectLst/>
+                          <a:latin typeface="Cambria"/>
+                          <a:ea typeface="ＭＳ 明朝"/>
+                          <a:cs typeface="Times New Roman"/>
+                        </a:rPr>
+                        <a:t>Recall</a:t>
+                      </a:r>
+                      <a:endParaRPr lang="en-US" sz="2400" dirty="0">
+                        <a:effectLst/>
+                        <a:latin typeface="Cambria"/>
+                        <a:ea typeface="ＭＳ 明朝"/>
+                        <a:cs typeface="Times New Roman"/>
+                      </a:endParaRPr>
+                    </a:p>
+                  </a:txBody>
+                  <a:tcPr marL="68580" marR="68580" marT="0" marB="0"/>
+                </a:tc>
+                <a:tc>
+                  <a:txBody>
+                    <a:bodyPr/>
+                    <a:lstStyle/>
+                    <a:p>
+                      <a:pPr marL="0" marR="0" algn="ctr">
+                        <a:lnSpc>
+                          <a:spcPct val="115000"/>
+                        </a:lnSpc>
+                        <a:spcBef>
+                          <a:spcPts val="0"/>
+                        </a:spcBef>
+                        <a:spcAft>
+                          <a:spcPts val="1000"/>
+                        </a:spcAft>
+                      </a:pPr>
+                      <a:r>
+                        <a:rPr lang="en-US" sz="2400" b="1" dirty="0">
+                          <a:effectLst/>
+                          <a:latin typeface="Cambria"/>
+                          <a:ea typeface="ＭＳ 明朝"/>
+                          <a:cs typeface="Times New Roman"/>
+                        </a:rPr>
+                        <a:t>F-score</a:t>
+                      </a:r>
+                      <a:endParaRPr lang="en-US" sz="2400" dirty="0">
+                        <a:effectLst/>
+                        <a:latin typeface="Cambria"/>
+                        <a:ea typeface="ＭＳ 明朝"/>
+                        <a:cs typeface="Times New Roman"/>
+                      </a:endParaRPr>
+                    </a:p>
+                  </a:txBody>
+                  <a:tcPr marL="68580" marR="68580" marT="0" marB="0"/>
+                </a:tc>
+              </a:tr>
+              <a:tr h="370840">
+                <a:tc>
+                  <a:txBody>
+                    <a:bodyPr/>
+                    <a:lstStyle/>
+                    <a:p>
+                      <a:pPr marL="0" marR="0" algn="l">
+                        <a:lnSpc>
+                          <a:spcPct val="115000"/>
+                        </a:lnSpc>
+                        <a:spcBef>
+                          <a:spcPts val="0"/>
+                        </a:spcBef>
+                        <a:spcAft>
+                          <a:spcPts val="1000"/>
+                        </a:spcAft>
+                      </a:pPr>
+                      <a:r>
+                        <a:rPr lang="en-US" sz="2400" dirty="0">
+                          <a:effectLst/>
+                          <a:latin typeface="Cambria"/>
+                          <a:ea typeface="ＭＳ 明朝"/>
+                          <a:cs typeface="Times New Roman"/>
+                        </a:rPr>
+                        <a:t>#Pictures</a:t>
+                      </a:r>
+                    </a:p>
+                  </a:txBody>
+                  <a:tcPr marL="68580" marR="68580" marT="0" marB="0"/>
+                </a:tc>
+                <a:tc>
+                  <a:txBody>
+                    <a:bodyPr/>
+                    <a:lstStyle/>
+                    <a:p>
+                      <a:pPr marL="0" marR="0" algn="ctr">
+                        <a:lnSpc>
+                          <a:spcPct val="115000"/>
+                        </a:lnSpc>
+                        <a:spcBef>
+                          <a:spcPts val="0"/>
+                        </a:spcBef>
+                        <a:spcAft>
+                          <a:spcPts val="1000"/>
+                        </a:spcAft>
+                      </a:pPr>
+                      <a:r>
+                        <a:rPr lang="en-US" sz="2400">
+                          <a:effectLst/>
+                          <a:latin typeface="Cambria"/>
+                          <a:ea typeface="ＭＳ 明朝"/>
+                          <a:cs typeface="Times New Roman"/>
+                        </a:rPr>
+                        <a:t>53.0</a:t>
+                      </a:r>
+                    </a:p>
+                  </a:txBody>
+                  <a:tcPr marL="68580" marR="68580" marT="0" marB="0"/>
+                </a:tc>
+                <a:tc>
+                  <a:txBody>
+                    <a:bodyPr/>
+                    <a:lstStyle/>
+                    <a:p>
+                      <a:pPr marL="0" marR="0" algn="ctr">
+                        <a:lnSpc>
+                          <a:spcPct val="115000"/>
+                        </a:lnSpc>
+                        <a:spcBef>
+                          <a:spcPts val="0"/>
+                        </a:spcBef>
+                        <a:spcAft>
+                          <a:spcPts val="1000"/>
+                        </a:spcAft>
+                      </a:pPr>
+                      <a:r>
+                        <a:rPr lang="en-US" sz="2400">
+                          <a:effectLst/>
+                          <a:latin typeface="Cambria"/>
+                          <a:ea typeface="ＭＳ 明朝"/>
+                          <a:cs typeface="Times New Roman"/>
+                        </a:rPr>
+                        <a:t>39.6</a:t>
+                      </a:r>
+                    </a:p>
+                  </a:txBody>
+                  <a:tcPr marL="68580" marR="68580" marT="0" marB="0"/>
+                </a:tc>
+                <a:tc>
+                  <a:txBody>
+                    <a:bodyPr/>
+                    <a:lstStyle/>
+                    <a:p>
+                      <a:pPr marL="0" marR="0" algn="ctr">
+                        <a:lnSpc>
+                          <a:spcPct val="115000"/>
+                        </a:lnSpc>
+                        <a:spcBef>
+                          <a:spcPts val="0"/>
+                        </a:spcBef>
+                        <a:spcAft>
+                          <a:spcPts val="1000"/>
+                        </a:spcAft>
+                      </a:pPr>
+                      <a:r>
+                        <a:rPr lang="en-US" sz="2400">
+                          <a:effectLst/>
+                          <a:latin typeface="Cambria"/>
+                          <a:ea typeface="ＭＳ 明朝"/>
+                          <a:cs typeface="Times New Roman"/>
+                        </a:rPr>
+                        <a:t>45.4</a:t>
+                      </a:r>
+                    </a:p>
+                  </a:txBody>
+                  <a:tcPr marL="68580" marR="68580" marT="0" marB="0"/>
+                </a:tc>
+              </a:tr>
+              <a:tr h="370840">
+                <a:tc>
+                  <a:txBody>
+                    <a:bodyPr/>
+                    <a:lstStyle/>
+                    <a:p>
+                      <a:pPr marL="0" marR="0" algn="l">
+                        <a:lnSpc>
+                          <a:spcPct val="115000"/>
+                        </a:lnSpc>
+                        <a:spcBef>
+                          <a:spcPts val="0"/>
+                        </a:spcBef>
+                        <a:spcAft>
+                          <a:spcPts val="1000"/>
+                        </a:spcAft>
+                      </a:pPr>
+                      <a:r>
+                        <a:rPr lang="en-US" sz="2400">
+                          <a:effectLst/>
+                          <a:latin typeface="Cambria"/>
+                          <a:ea typeface="ＭＳ 明朝"/>
+                          <a:cs typeface="Times New Roman"/>
+                        </a:rPr>
+                        <a:t>#Formulas</a:t>
+                      </a:r>
+                    </a:p>
+                  </a:txBody>
+                  <a:tcPr marL="68580" marR="68580" marT="0" marB="0"/>
+                </a:tc>
+                <a:tc>
+                  <a:txBody>
+                    <a:bodyPr/>
+                    <a:lstStyle/>
+                    <a:p>
+                      <a:pPr marL="0" marR="0" algn="ctr">
+                        <a:lnSpc>
+                          <a:spcPct val="115000"/>
+                        </a:lnSpc>
+                        <a:spcBef>
+                          <a:spcPts val="0"/>
+                        </a:spcBef>
+                        <a:spcAft>
+                          <a:spcPts val="1000"/>
+                        </a:spcAft>
+                      </a:pPr>
+                      <a:r>
+                        <a:rPr lang="en-US" sz="2400">
+                          <a:effectLst/>
+                          <a:latin typeface="Cambria"/>
+                          <a:ea typeface="ＭＳ 明朝"/>
+                          <a:cs typeface="Times New Roman"/>
+                        </a:rPr>
+                        <a:t>70.5</a:t>
+                      </a:r>
+                    </a:p>
+                  </a:txBody>
+                  <a:tcPr marL="68580" marR="68580" marT="0" marB="0"/>
+                </a:tc>
+                <a:tc>
+                  <a:txBody>
+                    <a:bodyPr/>
+                    <a:lstStyle/>
+                    <a:p>
+                      <a:pPr marL="0" marR="0" algn="ctr">
+                        <a:lnSpc>
+                          <a:spcPct val="115000"/>
+                        </a:lnSpc>
+                        <a:spcBef>
+                          <a:spcPts val="0"/>
+                        </a:spcBef>
+                        <a:spcAft>
+                          <a:spcPts val="1000"/>
+                        </a:spcAft>
+                      </a:pPr>
+                      <a:r>
+                        <a:rPr lang="en-US" sz="2400">
+                          <a:effectLst/>
+                          <a:latin typeface="Cambria"/>
+                          <a:ea typeface="ＭＳ 明朝"/>
+                          <a:cs typeface="Times New Roman"/>
+                        </a:rPr>
+                        <a:t>66.7</a:t>
+                      </a:r>
+                    </a:p>
+                  </a:txBody>
+                  <a:tcPr marL="68580" marR="68580" marT="0" marB="0"/>
+                </a:tc>
+                <a:tc>
+                  <a:txBody>
+                    <a:bodyPr/>
+                    <a:lstStyle/>
+                    <a:p>
+                      <a:pPr marL="0" marR="0" algn="ctr">
+                        <a:lnSpc>
+                          <a:spcPct val="115000"/>
+                        </a:lnSpc>
+                        <a:spcBef>
+                          <a:spcPts val="0"/>
+                        </a:spcBef>
+                        <a:spcAft>
+                          <a:spcPts val="1000"/>
+                        </a:spcAft>
+                      </a:pPr>
+                      <a:r>
+                        <a:rPr lang="en-US" sz="2400">
+                          <a:effectLst/>
+                          <a:latin typeface="Cambria"/>
+                          <a:ea typeface="ＭＳ 明朝"/>
+                          <a:cs typeface="Times New Roman"/>
+                        </a:rPr>
+                        <a:t>68.5</a:t>
+                      </a:r>
+                    </a:p>
+                  </a:txBody>
+                  <a:tcPr marL="68580" marR="68580" marT="0" marB="0"/>
+                </a:tc>
+              </a:tr>
+              <a:tr h="370840">
+                <a:tc>
+                  <a:txBody>
+                    <a:bodyPr/>
+                    <a:lstStyle/>
+                    <a:p>
+                      <a:pPr marL="0" marR="0" algn="l">
+                        <a:lnSpc>
+                          <a:spcPct val="115000"/>
+                        </a:lnSpc>
+                        <a:spcBef>
+                          <a:spcPts val="0"/>
+                        </a:spcBef>
+                        <a:spcAft>
+                          <a:spcPts val="1000"/>
+                        </a:spcAft>
+                      </a:pPr>
+                      <a:r>
+                        <a:rPr lang="en-US" sz="2400">
+                          <a:effectLst/>
+                          <a:latin typeface="Cambria"/>
+                          <a:ea typeface="ＭＳ 明朝"/>
+                          <a:cs typeface="Times New Roman"/>
+                        </a:rPr>
+                        <a:t>#Tables</a:t>
+                      </a:r>
+                    </a:p>
+                  </a:txBody>
+                  <a:tcPr marL="68580" marR="68580" marT="0" marB="0"/>
+                </a:tc>
+                <a:tc>
+                  <a:txBody>
+                    <a:bodyPr/>
+                    <a:lstStyle/>
+                    <a:p>
+                      <a:pPr marL="0" marR="0" algn="ctr">
+                        <a:lnSpc>
+                          <a:spcPct val="115000"/>
+                        </a:lnSpc>
+                        <a:spcBef>
+                          <a:spcPts val="0"/>
+                        </a:spcBef>
+                        <a:spcAft>
+                          <a:spcPts val="1000"/>
+                        </a:spcAft>
+                      </a:pPr>
+                      <a:r>
+                        <a:rPr lang="en-US" sz="2400">
+                          <a:effectLst/>
+                          <a:latin typeface="Cambria"/>
+                          <a:ea typeface="ＭＳ 明朝"/>
+                          <a:cs typeface="Times New Roman"/>
+                        </a:rPr>
+                        <a:t>72.6</a:t>
+                      </a:r>
+                    </a:p>
+                  </a:txBody>
+                  <a:tcPr marL="68580" marR="68580" marT="0" marB="0"/>
+                </a:tc>
+                <a:tc>
+                  <a:txBody>
+                    <a:bodyPr/>
+                    <a:lstStyle/>
+                    <a:p>
+                      <a:pPr marL="0" marR="0" algn="ctr">
+                        <a:lnSpc>
+                          <a:spcPct val="115000"/>
+                        </a:lnSpc>
+                        <a:spcBef>
+                          <a:spcPts val="0"/>
+                        </a:spcBef>
+                        <a:spcAft>
+                          <a:spcPts val="1000"/>
+                        </a:spcAft>
+                      </a:pPr>
+                      <a:r>
+                        <a:rPr lang="en-US" sz="2400">
+                          <a:effectLst/>
+                          <a:latin typeface="Cambria"/>
+                          <a:ea typeface="ＭＳ 明朝"/>
+                          <a:cs typeface="Times New Roman"/>
+                        </a:rPr>
+                        <a:t>69.4</a:t>
+                      </a:r>
+                    </a:p>
+                  </a:txBody>
+                  <a:tcPr marL="68580" marR="68580" marT="0" marB="0"/>
+                </a:tc>
+                <a:tc>
+                  <a:txBody>
+                    <a:bodyPr/>
+                    <a:lstStyle/>
+                    <a:p>
+                      <a:pPr marL="0" marR="0" algn="ctr">
+                        <a:lnSpc>
+                          <a:spcPct val="115000"/>
+                        </a:lnSpc>
+                        <a:spcBef>
+                          <a:spcPts val="0"/>
+                        </a:spcBef>
+                        <a:spcAft>
+                          <a:spcPts val="1000"/>
+                        </a:spcAft>
+                      </a:pPr>
+                      <a:r>
+                        <a:rPr lang="en-US" sz="2400">
+                          <a:effectLst/>
+                          <a:latin typeface="Cambria"/>
+                          <a:ea typeface="ＭＳ 明朝"/>
+                          <a:cs typeface="Times New Roman"/>
+                        </a:rPr>
+                        <a:t>71.0</a:t>
+                      </a:r>
+                    </a:p>
+                  </a:txBody>
+                  <a:tcPr marL="68580" marR="68580" marT="0" marB="0"/>
+                </a:tc>
+              </a:tr>
+              <a:tr h="370840">
+                <a:tc>
+                  <a:txBody>
+                    <a:bodyPr/>
+                    <a:lstStyle/>
+                    <a:p>
+                      <a:pPr marL="0" marR="0" algn="l">
+                        <a:lnSpc>
+                          <a:spcPct val="115000"/>
+                        </a:lnSpc>
+                        <a:spcBef>
+                          <a:spcPts val="0"/>
+                        </a:spcBef>
+                        <a:spcAft>
+                          <a:spcPts val="1000"/>
+                        </a:spcAft>
+                      </a:pPr>
+                      <a:r>
+                        <a:rPr lang="en-US" sz="2400">
+                          <a:effectLst/>
+                          <a:latin typeface="Cambria"/>
+                          <a:ea typeface="ＭＳ 明朝"/>
+                          <a:cs typeface="Times New Roman"/>
+                        </a:rPr>
+                        <a:t>Metadata</a:t>
+                      </a:r>
+                    </a:p>
+                  </a:txBody>
+                  <a:tcPr marL="68580" marR="68580" marT="0" marB="0"/>
+                </a:tc>
+                <a:tc>
+                  <a:txBody>
+                    <a:bodyPr/>
+                    <a:lstStyle/>
+                    <a:p>
+                      <a:pPr marL="0" marR="0" algn="ctr">
+                        <a:lnSpc>
+                          <a:spcPct val="115000"/>
+                        </a:lnSpc>
+                        <a:spcBef>
+                          <a:spcPts val="0"/>
+                        </a:spcBef>
+                        <a:spcAft>
+                          <a:spcPts val="1000"/>
+                        </a:spcAft>
+                      </a:pPr>
+                      <a:r>
+                        <a:rPr lang="en-US" sz="2400">
+                          <a:effectLst/>
+                          <a:latin typeface="Cambria"/>
+                          <a:ea typeface="ＭＳ 明朝"/>
+                          <a:cs typeface="Times New Roman"/>
+                        </a:rPr>
+                        <a:t>73.5</a:t>
+                      </a:r>
+                    </a:p>
+                  </a:txBody>
+                  <a:tcPr marL="68580" marR="68580" marT="0" marB="0"/>
+                </a:tc>
+                <a:tc>
+                  <a:txBody>
+                    <a:bodyPr/>
+                    <a:lstStyle/>
+                    <a:p>
+                      <a:pPr marL="0" marR="0" algn="ctr">
+                        <a:lnSpc>
+                          <a:spcPct val="115000"/>
+                        </a:lnSpc>
+                        <a:spcBef>
+                          <a:spcPts val="0"/>
+                        </a:spcBef>
+                        <a:spcAft>
+                          <a:spcPts val="1000"/>
+                        </a:spcAft>
+                      </a:pPr>
+                      <a:r>
+                        <a:rPr lang="en-US" sz="2400" dirty="0">
+                          <a:effectLst/>
+                          <a:latin typeface="Cambria"/>
+                          <a:ea typeface="ＭＳ 明朝"/>
+                          <a:cs typeface="Times New Roman"/>
+                        </a:rPr>
+                        <a:t>74.8</a:t>
+                      </a:r>
+                    </a:p>
+                  </a:txBody>
+                  <a:tcPr marL="68580" marR="68580" marT="0" marB="0"/>
+                </a:tc>
+                <a:tc>
+                  <a:txBody>
+                    <a:bodyPr/>
+                    <a:lstStyle/>
+                    <a:p>
+                      <a:pPr marL="0" marR="0" algn="ctr">
+                        <a:lnSpc>
+                          <a:spcPct val="115000"/>
+                        </a:lnSpc>
+                        <a:spcBef>
+                          <a:spcPts val="0"/>
+                        </a:spcBef>
+                        <a:spcAft>
+                          <a:spcPts val="1000"/>
+                        </a:spcAft>
+                      </a:pPr>
+                      <a:r>
+                        <a:rPr lang="en-US" sz="2400">
+                          <a:effectLst/>
+                          <a:latin typeface="Cambria"/>
+                          <a:ea typeface="ＭＳ 明朝"/>
+                          <a:cs typeface="Times New Roman"/>
+                        </a:rPr>
+                        <a:t>74.1</a:t>
+                      </a:r>
+                    </a:p>
+                  </a:txBody>
+                  <a:tcPr marL="68580" marR="68580" marT="0" marB="0"/>
+                </a:tc>
+              </a:tr>
+              <a:tr h="370840">
+                <a:tc>
+                  <a:txBody>
+                    <a:bodyPr/>
+                    <a:lstStyle/>
+                    <a:p>
+                      <a:pPr marL="0" marR="0" algn="l">
+                        <a:lnSpc>
+                          <a:spcPct val="115000"/>
+                        </a:lnSpc>
+                        <a:spcBef>
+                          <a:spcPts val="0"/>
+                        </a:spcBef>
+                        <a:spcAft>
+                          <a:spcPts val="1000"/>
+                        </a:spcAft>
+                      </a:pPr>
+                      <a:r>
+                        <a:rPr lang="en-US" sz="2400">
+                          <a:effectLst/>
+                          <a:latin typeface="Cambria"/>
+                          <a:ea typeface="ＭＳ 明朝"/>
+                          <a:cs typeface="Times New Roman"/>
+                        </a:rPr>
+                        <a:t>Title</a:t>
+                      </a:r>
+                    </a:p>
+                  </a:txBody>
+                  <a:tcPr marL="68580" marR="68580" marT="0" marB="0"/>
+                </a:tc>
+                <a:tc>
+                  <a:txBody>
+                    <a:bodyPr/>
+                    <a:lstStyle/>
+                    <a:p>
+                      <a:pPr marL="0" marR="0" algn="ctr">
+                        <a:lnSpc>
+                          <a:spcPct val="115000"/>
+                        </a:lnSpc>
+                        <a:spcBef>
+                          <a:spcPts val="0"/>
+                        </a:spcBef>
+                        <a:spcAft>
+                          <a:spcPts val="1000"/>
+                        </a:spcAft>
+                      </a:pPr>
+                      <a:r>
+                        <a:rPr lang="en-US" sz="2400">
+                          <a:effectLst/>
+                          <a:latin typeface="Cambria"/>
+                          <a:ea typeface="ＭＳ 明朝"/>
+                          <a:cs typeface="Times New Roman"/>
+                        </a:rPr>
+                        <a:t>64.3</a:t>
+                      </a:r>
+                    </a:p>
+                  </a:txBody>
+                  <a:tcPr marL="68580" marR="68580" marT="0" marB="0"/>
+                </a:tc>
+                <a:tc>
+                  <a:txBody>
+                    <a:bodyPr/>
+                    <a:lstStyle/>
+                    <a:p>
+                      <a:pPr marL="0" marR="0" algn="ctr">
+                        <a:lnSpc>
+                          <a:spcPct val="115000"/>
+                        </a:lnSpc>
+                        <a:spcBef>
+                          <a:spcPts val="0"/>
+                        </a:spcBef>
+                        <a:spcAft>
+                          <a:spcPts val="1000"/>
+                        </a:spcAft>
+                      </a:pPr>
+                      <a:r>
+                        <a:rPr lang="en-US" sz="2400">
+                          <a:effectLst/>
+                          <a:latin typeface="Cambria"/>
+                          <a:ea typeface="ＭＳ 明朝"/>
+                          <a:cs typeface="Times New Roman"/>
+                        </a:rPr>
+                        <a:t>56.8</a:t>
+                      </a:r>
+                    </a:p>
+                  </a:txBody>
+                  <a:tcPr marL="68580" marR="68580" marT="0" marB="0"/>
+                </a:tc>
+                <a:tc>
+                  <a:txBody>
+                    <a:bodyPr/>
+                    <a:lstStyle/>
+                    <a:p>
+                      <a:pPr marL="0" marR="0" algn="ctr">
+                        <a:lnSpc>
+                          <a:spcPct val="115000"/>
+                        </a:lnSpc>
+                        <a:spcBef>
+                          <a:spcPts val="0"/>
+                        </a:spcBef>
+                        <a:spcAft>
+                          <a:spcPts val="1000"/>
+                        </a:spcAft>
+                      </a:pPr>
+                      <a:r>
+                        <a:rPr lang="en-US" sz="2400">
+                          <a:effectLst/>
+                          <a:latin typeface="Cambria"/>
+                          <a:ea typeface="ＭＳ 明朝"/>
+                          <a:cs typeface="Times New Roman"/>
+                        </a:rPr>
+                        <a:t>60.2</a:t>
+                      </a:r>
+                    </a:p>
+                  </a:txBody>
+                  <a:tcPr marL="68580" marR="68580" marT="0" marB="0"/>
+                </a:tc>
+              </a:tr>
+              <a:tr h="370840">
+                <a:tc>
+                  <a:txBody>
+                    <a:bodyPr/>
+                    <a:lstStyle/>
+                    <a:p>
+                      <a:pPr marL="0" marR="0" algn="l">
+                        <a:lnSpc>
+                          <a:spcPct val="115000"/>
+                        </a:lnSpc>
+                        <a:spcBef>
+                          <a:spcPts val="0"/>
+                        </a:spcBef>
+                        <a:spcAft>
+                          <a:spcPts val="1000"/>
+                        </a:spcAft>
+                      </a:pPr>
+                      <a:r>
+                        <a:rPr lang="en-US" sz="2400">
+                          <a:effectLst/>
+                          <a:latin typeface="Cambria"/>
+                          <a:ea typeface="ＭＳ 明朝"/>
+                          <a:cs typeface="Times New Roman"/>
+                        </a:rPr>
+                        <a:t>LDA Topic</a:t>
+                      </a:r>
+                    </a:p>
+                  </a:txBody>
+                  <a:tcPr marL="68580" marR="68580" marT="0" marB="0"/>
+                </a:tc>
+                <a:tc>
+                  <a:txBody>
+                    <a:bodyPr/>
+                    <a:lstStyle/>
+                    <a:p>
+                      <a:pPr marL="0" marR="0" algn="ctr">
+                        <a:lnSpc>
+                          <a:spcPct val="115000"/>
+                        </a:lnSpc>
+                        <a:spcBef>
+                          <a:spcPts val="0"/>
+                        </a:spcBef>
+                        <a:spcAft>
+                          <a:spcPts val="1000"/>
+                        </a:spcAft>
+                      </a:pPr>
+                      <a:r>
+                        <a:rPr lang="en-US" sz="2400" dirty="0">
+                          <a:effectLst/>
+                          <a:latin typeface="Cambria"/>
+                          <a:ea typeface="ＭＳ 明朝"/>
+                          <a:cs typeface="Times New Roman"/>
+                        </a:rPr>
+                        <a:t>78.5</a:t>
+                      </a:r>
+                    </a:p>
+                  </a:txBody>
+                  <a:tcPr marL="68580" marR="68580" marT="0" marB="0"/>
+                </a:tc>
+                <a:tc>
+                  <a:txBody>
+                    <a:bodyPr/>
+                    <a:lstStyle/>
+                    <a:p>
+                      <a:pPr marL="0" marR="0" algn="ctr">
+                        <a:lnSpc>
+                          <a:spcPct val="115000"/>
+                        </a:lnSpc>
+                        <a:spcBef>
+                          <a:spcPts val="0"/>
+                        </a:spcBef>
+                        <a:spcAft>
+                          <a:spcPts val="1000"/>
+                        </a:spcAft>
+                      </a:pPr>
+                      <a:r>
+                        <a:rPr lang="en-US" sz="2400">
+                          <a:effectLst/>
+                          <a:latin typeface="Cambria"/>
+                          <a:ea typeface="ＭＳ 明朝"/>
+                          <a:cs typeface="Times New Roman"/>
+                        </a:rPr>
+                        <a:t>75.6</a:t>
+                      </a:r>
+                    </a:p>
+                  </a:txBody>
+                  <a:tcPr marL="68580" marR="68580" marT="0" marB="0"/>
+                </a:tc>
+                <a:tc>
+                  <a:txBody>
+                    <a:bodyPr/>
+                    <a:lstStyle/>
+                    <a:p>
+                      <a:pPr marL="0" marR="0" algn="ctr">
+                        <a:lnSpc>
+                          <a:spcPct val="115000"/>
+                        </a:lnSpc>
+                        <a:spcBef>
+                          <a:spcPts val="0"/>
+                        </a:spcBef>
+                        <a:spcAft>
+                          <a:spcPts val="1000"/>
+                        </a:spcAft>
+                      </a:pPr>
+                      <a:r>
+                        <a:rPr lang="en-US" sz="2400">
+                          <a:effectLst/>
+                          <a:latin typeface="Cambria"/>
+                          <a:ea typeface="ＭＳ 明朝"/>
+                          <a:cs typeface="Times New Roman"/>
+                        </a:rPr>
+                        <a:t>77.1</a:t>
+                      </a:r>
+                    </a:p>
+                  </a:txBody>
+                  <a:tcPr marL="68580" marR="68580" marT="0" marB="0"/>
+                </a:tc>
+              </a:tr>
+              <a:tr h="370840">
+                <a:tc>
+                  <a:txBody>
+                    <a:bodyPr/>
+                    <a:lstStyle/>
+                    <a:p>
+                      <a:pPr marL="0" marR="0" algn="l">
+                        <a:lnSpc>
+                          <a:spcPct val="115000"/>
+                        </a:lnSpc>
+                        <a:spcBef>
+                          <a:spcPts val="0"/>
+                        </a:spcBef>
+                        <a:spcAft>
+                          <a:spcPts val="1000"/>
+                        </a:spcAft>
+                      </a:pPr>
+                      <a:r>
+                        <a:rPr lang="en-US" sz="2400" dirty="0">
+                          <a:effectLst/>
+                          <a:latin typeface="Cambria"/>
+                          <a:ea typeface="ＭＳ 明朝"/>
+                          <a:cs typeface="Times New Roman"/>
+                        </a:rPr>
+                        <a:t>Popular </a:t>
+                      </a:r>
+                      <a:r>
+                        <a:rPr lang="en-US" sz="2400" dirty="0" smtClean="0">
+                          <a:effectLst/>
+                          <a:latin typeface="Cambria"/>
+                          <a:ea typeface="ＭＳ 明朝"/>
+                          <a:cs typeface="Times New Roman"/>
+                        </a:rPr>
+                        <a:t>Tech.</a:t>
+                      </a:r>
+                      <a:endParaRPr lang="en-US" sz="2400" dirty="0">
+                        <a:effectLst/>
+                        <a:latin typeface="Cambria"/>
+                        <a:ea typeface="ＭＳ 明朝"/>
+                        <a:cs typeface="Times New Roman"/>
+                      </a:endParaRPr>
+                    </a:p>
+                  </a:txBody>
+                  <a:tcPr marL="68580" marR="68580" marT="0" marB="0"/>
+                </a:tc>
+                <a:tc>
+                  <a:txBody>
+                    <a:bodyPr/>
+                    <a:lstStyle/>
+                    <a:p>
+                      <a:pPr marL="0" marR="0" algn="ctr">
+                        <a:lnSpc>
+                          <a:spcPct val="115000"/>
+                        </a:lnSpc>
+                        <a:spcBef>
+                          <a:spcPts val="0"/>
+                        </a:spcBef>
+                        <a:spcAft>
+                          <a:spcPts val="1000"/>
+                        </a:spcAft>
+                      </a:pPr>
+                      <a:r>
+                        <a:rPr lang="en-US" sz="2400">
+                          <a:effectLst/>
+                          <a:latin typeface="Cambria"/>
+                          <a:ea typeface="ＭＳ 明朝"/>
+                          <a:cs typeface="Times New Roman"/>
+                        </a:rPr>
+                        <a:t>53.0</a:t>
+                      </a:r>
+                    </a:p>
+                  </a:txBody>
+                  <a:tcPr marL="68580" marR="68580" marT="0" marB="0"/>
+                </a:tc>
+                <a:tc>
+                  <a:txBody>
+                    <a:bodyPr/>
+                    <a:lstStyle/>
+                    <a:p>
+                      <a:pPr marL="0" marR="0" algn="ctr">
+                        <a:lnSpc>
+                          <a:spcPct val="115000"/>
+                        </a:lnSpc>
+                        <a:spcBef>
+                          <a:spcPts val="0"/>
+                        </a:spcBef>
+                        <a:spcAft>
+                          <a:spcPts val="1000"/>
+                        </a:spcAft>
+                      </a:pPr>
+                      <a:r>
+                        <a:rPr lang="en-US" sz="2400">
+                          <a:effectLst/>
+                          <a:latin typeface="Cambria"/>
+                          <a:ea typeface="ＭＳ 明朝"/>
+                          <a:cs typeface="Times New Roman"/>
+                        </a:rPr>
+                        <a:t>40.5</a:t>
+                      </a:r>
+                    </a:p>
+                  </a:txBody>
+                  <a:tcPr marL="68580" marR="68580" marT="0" marB="0"/>
+                </a:tc>
+                <a:tc>
+                  <a:txBody>
+                    <a:bodyPr/>
+                    <a:lstStyle/>
+                    <a:p>
+                      <a:pPr marL="0" marR="0" algn="ctr">
+                        <a:lnSpc>
+                          <a:spcPct val="115000"/>
+                        </a:lnSpc>
+                        <a:spcBef>
+                          <a:spcPts val="0"/>
+                        </a:spcBef>
+                        <a:spcAft>
+                          <a:spcPts val="1000"/>
+                        </a:spcAft>
+                      </a:pPr>
+                      <a:r>
+                        <a:rPr lang="en-US" sz="2400">
+                          <a:effectLst/>
+                          <a:latin typeface="Cambria"/>
+                          <a:ea typeface="ＭＳ 明朝"/>
+                          <a:cs typeface="Times New Roman"/>
+                        </a:rPr>
+                        <a:t>46.0</a:t>
+                      </a:r>
+                    </a:p>
+                  </a:txBody>
+                  <a:tcPr marL="68580" marR="68580" marT="0" marB="0"/>
+                </a:tc>
+              </a:tr>
+              <a:tr h="370840">
+                <a:tc>
+                  <a:txBody>
+                    <a:bodyPr/>
+                    <a:lstStyle/>
+                    <a:p>
+                      <a:pPr marL="0" marR="0" algn="l">
+                        <a:lnSpc>
+                          <a:spcPct val="115000"/>
+                        </a:lnSpc>
+                        <a:spcBef>
+                          <a:spcPts val="0"/>
+                        </a:spcBef>
+                        <a:spcAft>
+                          <a:spcPts val="1000"/>
+                        </a:spcAft>
+                      </a:pPr>
+                      <a:r>
+                        <a:rPr lang="en-US" sz="2400">
+                          <a:effectLst/>
+                          <a:latin typeface="Cambria"/>
+                          <a:ea typeface="ＭＳ 明朝"/>
+                          <a:cs typeface="Times New Roman"/>
+                        </a:rPr>
+                        <a:t>Author Ranking</a:t>
+                      </a:r>
+                    </a:p>
+                  </a:txBody>
+                  <a:tcPr marL="68580" marR="68580" marT="0" marB="0"/>
+                </a:tc>
+                <a:tc>
+                  <a:txBody>
+                    <a:bodyPr/>
+                    <a:lstStyle/>
+                    <a:p>
+                      <a:pPr marL="0" marR="0" algn="ctr">
+                        <a:lnSpc>
+                          <a:spcPct val="115000"/>
+                        </a:lnSpc>
+                        <a:spcBef>
+                          <a:spcPts val="0"/>
+                        </a:spcBef>
+                        <a:spcAft>
+                          <a:spcPts val="1000"/>
+                        </a:spcAft>
+                      </a:pPr>
+                      <a:r>
+                        <a:rPr lang="en-US" sz="2400">
+                          <a:effectLst/>
+                          <a:latin typeface="Cambria"/>
+                          <a:ea typeface="ＭＳ 明朝"/>
+                          <a:cs typeface="Times New Roman"/>
+                        </a:rPr>
+                        <a:t>40.3</a:t>
+                      </a:r>
+                    </a:p>
+                  </a:txBody>
+                  <a:tcPr marL="68580" marR="68580" marT="0" marB="0"/>
+                </a:tc>
+                <a:tc>
+                  <a:txBody>
+                    <a:bodyPr/>
+                    <a:lstStyle/>
+                    <a:p>
+                      <a:pPr marL="0" marR="0" algn="ctr">
+                        <a:lnSpc>
+                          <a:spcPct val="115000"/>
+                        </a:lnSpc>
+                        <a:spcBef>
+                          <a:spcPts val="0"/>
+                        </a:spcBef>
+                        <a:spcAft>
+                          <a:spcPts val="1000"/>
+                        </a:spcAft>
+                      </a:pPr>
+                      <a:r>
+                        <a:rPr lang="en-US" sz="2400">
+                          <a:effectLst/>
+                          <a:latin typeface="Cambria"/>
+                          <a:ea typeface="ＭＳ 明朝"/>
+                          <a:cs typeface="Times New Roman"/>
+                        </a:rPr>
+                        <a:t>71.2</a:t>
+                      </a:r>
+                    </a:p>
+                  </a:txBody>
+                  <a:tcPr marL="68580" marR="68580" marT="0" marB="0"/>
+                </a:tc>
+                <a:tc>
+                  <a:txBody>
+                    <a:bodyPr/>
+                    <a:lstStyle/>
+                    <a:p>
+                      <a:pPr marL="0" marR="0" algn="ctr">
+                        <a:lnSpc>
+                          <a:spcPct val="115000"/>
+                        </a:lnSpc>
+                        <a:spcBef>
+                          <a:spcPts val="0"/>
+                        </a:spcBef>
+                        <a:spcAft>
+                          <a:spcPts val="1000"/>
+                        </a:spcAft>
+                      </a:pPr>
+                      <a:r>
+                        <a:rPr lang="en-US" sz="2400">
+                          <a:effectLst/>
+                          <a:latin typeface="Cambria"/>
+                          <a:ea typeface="ＭＳ 明朝"/>
+                          <a:cs typeface="Times New Roman"/>
+                        </a:rPr>
+                        <a:t>52.5</a:t>
+                      </a:r>
+                    </a:p>
+                  </a:txBody>
+                  <a:tcPr marL="68580" marR="68580" marT="0" marB="0"/>
+                </a:tc>
+              </a:tr>
+              <a:tr h="370840">
+                <a:tc>
+                  <a:txBody>
+                    <a:bodyPr/>
+                    <a:lstStyle/>
+                    <a:p>
+                      <a:pPr marL="0" marR="0" algn="l">
+                        <a:lnSpc>
+                          <a:spcPct val="115000"/>
+                        </a:lnSpc>
+                        <a:spcBef>
+                          <a:spcPts val="0"/>
+                        </a:spcBef>
+                        <a:spcAft>
+                          <a:spcPts val="1000"/>
+                        </a:spcAft>
+                      </a:pPr>
+                      <a:r>
+                        <a:rPr lang="en-US" sz="2400">
+                          <a:effectLst/>
+                          <a:latin typeface="Cambria"/>
+                          <a:ea typeface="ＭＳ 明朝"/>
+                          <a:cs typeface="Times New Roman"/>
+                        </a:rPr>
+                        <a:t>Metadata+LDA</a:t>
+                      </a:r>
+                    </a:p>
+                  </a:txBody>
+                  <a:tcPr marL="68580" marR="68580" marT="0" marB="0"/>
+                </a:tc>
+                <a:tc>
+                  <a:txBody>
+                    <a:bodyPr/>
+                    <a:lstStyle/>
+                    <a:p>
+                      <a:pPr marL="0" marR="0" algn="ctr">
+                        <a:lnSpc>
+                          <a:spcPct val="115000"/>
+                        </a:lnSpc>
+                        <a:spcBef>
+                          <a:spcPts val="0"/>
+                        </a:spcBef>
+                        <a:spcAft>
+                          <a:spcPts val="1000"/>
+                        </a:spcAft>
+                      </a:pPr>
+                      <a:r>
+                        <a:rPr lang="en-US" sz="2400">
+                          <a:effectLst/>
+                          <a:latin typeface="Cambria"/>
+                          <a:ea typeface="ＭＳ 明朝"/>
+                          <a:cs typeface="Times New Roman"/>
+                        </a:rPr>
+                        <a:t>81.4</a:t>
+                      </a:r>
+                    </a:p>
+                  </a:txBody>
+                  <a:tcPr marL="68580" marR="68580" marT="0" marB="0"/>
+                </a:tc>
+                <a:tc>
+                  <a:txBody>
+                    <a:bodyPr/>
+                    <a:lstStyle/>
+                    <a:p>
+                      <a:pPr marL="0" marR="0" algn="ctr">
+                        <a:lnSpc>
+                          <a:spcPct val="115000"/>
+                        </a:lnSpc>
+                        <a:spcBef>
+                          <a:spcPts val="0"/>
+                        </a:spcBef>
+                        <a:spcAft>
+                          <a:spcPts val="1000"/>
+                        </a:spcAft>
+                      </a:pPr>
+                      <a:r>
+                        <a:rPr lang="en-US" sz="2400" b="1" dirty="0">
+                          <a:effectLst/>
+                          <a:latin typeface="Cambria"/>
+                          <a:ea typeface="ＭＳ 明朝"/>
+                          <a:cs typeface="Times New Roman"/>
+                        </a:rPr>
+                        <a:t>82.9</a:t>
+                      </a:r>
+                    </a:p>
+                  </a:txBody>
+                  <a:tcPr marL="68580" marR="68580" marT="0" marB="0"/>
+                </a:tc>
+                <a:tc>
+                  <a:txBody>
+                    <a:bodyPr/>
+                    <a:lstStyle/>
+                    <a:p>
+                      <a:pPr marL="0" marR="0" algn="ctr">
+                        <a:lnSpc>
+                          <a:spcPct val="115000"/>
+                        </a:lnSpc>
+                        <a:spcBef>
+                          <a:spcPts val="0"/>
+                        </a:spcBef>
+                        <a:spcAft>
+                          <a:spcPts val="1000"/>
+                        </a:spcAft>
+                      </a:pPr>
+                      <a:r>
+                        <a:rPr lang="en-US" sz="2400" b="1" dirty="0">
+                          <a:effectLst/>
+                          <a:latin typeface="Cambria"/>
+                          <a:ea typeface="ＭＳ 明朝"/>
+                          <a:cs typeface="Times New Roman"/>
+                        </a:rPr>
+                        <a:t>82.1</a:t>
+                      </a:r>
+                    </a:p>
+                  </a:txBody>
+                  <a:tcPr marL="68580" marR="68580" marT="0" marB="0"/>
+                </a:tc>
+              </a:tr>
+              <a:tr h="370840">
+                <a:tc>
+                  <a:txBody>
+                    <a:bodyPr/>
+                    <a:lstStyle/>
+                    <a:p>
+                      <a:pPr marL="0" marR="0" algn="l">
+                        <a:lnSpc>
+                          <a:spcPct val="115000"/>
+                        </a:lnSpc>
+                        <a:spcBef>
+                          <a:spcPts val="0"/>
+                        </a:spcBef>
+                        <a:spcAft>
+                          <a:spcPts val="1000"/>
+                        </a:spcAft>
+                      </a:pPr>
+                      <a:r>
+                        <a:rPr lang="en-US" sz="2400">
+                          <a:effectLst/>
+                          <a:latin typeface="Cambria"/>
+                          <a:ea typeface="ＭＳ 明朝"/>
+                          <a:cs typeface="Times New Roman"/>
+                        </a:rPr>
+                        <a:t>All features</a:t>
+                      </a:r>
+                    </a:p>
+                  </a:txBody>
+                  <a:tcPr marL="68580" marR="68580" marT="0" marB="0"/>
+                </a:tc>
+                <a:tc>
+                  <a:txBody>
+                    <a:bodyPr/>
+                    <a:lstStyle/>
+                    <a:p>
+                      <a:pPr marL="0" marR="0" algn="ctr">
+                        <a:lnSpc>
+                          <a:spcPct val="115000"/>
+                        </a:lnSpc>
+                        <a:spcBef>
+                          <a:spcPts val="0"/>
+                        </a:spcBef>
+                        <a:spcAft>
+                          <a:spcPts val="1000"/>
+                        </a:spcAft>
+                      </a:pPr>
+                      <a:r>
+                        <a:rPr lang="en-US" sz="2400" b="1" dirty="0">
+                          <a:effectLst/>
+                          <a:latin typeface="Cambria"/>
+                          <a:ea typeface="ＭＳ 明朝"/>
+                          <a:cs typeface="Times New Roman"/>
+                        </a:rPr>
+                        <a:t>85.0</a:t>
+                      </a:r>
+                    </a:p>
+                  </a:txBody>
+                  <a:tcPr marL="68580" marR="68580" marT="0" marB="0"/>
+                </a:tc>
+                <a:tc>
+                  <a:txBody>
+                    <a:bodyPr/>
+                    <a:lstStyle/>
+                    <a:p>
+                      <a:pPr marL="0" marR="0" algn="ctr">
+                        <a:lnSpc>
+                          <a:spcPct val="115000"/>
+                        </a:lnSpc>
+                        <a:spcBef>
+                          <a:spcPts val="0"/>
+                        </a:spcBef>
+                        <a:spcAft>
+                          <a:spcPts val="1000"/>
+                        </a:spcAft>
+                      </a:pPr>
+                      <a:r>
+                        <a:rPr lang="en-US" sz="2400">
+                          <a:effectLst/>
+                          <a:latin typeface="Cambria"/>
+                          <a:ea typeface="ＭＳ 明朝"/>
+                          <a:cs typeface="Times New Roman"/>
+                        </a:rPr>
+                        <a:t>76.6</a:t>
+                      </a:r>
+                    </a:p>
+                  </a:txBody>
+                  <a:tcPr marL="68580" marR="68580" marT="0" marB="0"/>
+                </a:tc>
+                <a:tc>
+                  <a:txBody>
+                    <a:bodyPr/>
+                    <a:lstStyle/>
+                    <a:p>
+                      <a:pPr marL="0" marR="0" algn="ctr">
+                        <a:lnSpc>
+                          <a:spcPct val="115000"/>
+                        </a:lnSpc>
+                        <a:spcBef>
+                          <a:spcPts val="0"/>
+                        </a:spcBef>
+                        <a:spcAft>
+                          <a:spcPts val="1000"/>
+                        </a:spcAft>
+                      </a:pPr>
+                      <a:r>
+                        <a:rPr lang="en-US" sz="2400">
+                          <a:effectLst/>
+                          <a:latin typeface="Cambria"/>
+                          <a:ea typeface="ＭＳ 明朝"/>
+                          <a:cs typeface="Times New Roman"/>
+                        </a:rPr>
+                        <a:t>80.6</a:t>
+                      </a:r>
+                    </a:p>
+                  </a:txBody>
+                  <a:tcPr marL="68580" marR="68580" marT="0" marB="0"/>
+                </a:tc>
+              </a:tr>
+              <a:tr h="370840">
+                <a:tc>
+                  <a:txBody>
+                    <a:bodyPr/>
+                    <a:lstStyle/>
+                    <a:p>
+                      <a:pPr marL="0" marR="0" algn="l">
+                        <a:lnSpc>
+                          <a:spcPct val="115000"/>
+                        </a:lnSpc>
+                        <a:spcBef>
+                          <a:spcPts val="0"/>
+                        </a:spcBef>
+                        <a:spcAft>
+                          <a:spcPts val="1000"/>
+                        </a:spcAft>
+                      </a:pPr>
+                      <a:r>
+                        <a:rPr lang="en-US" sz="2400">
+                          <a:effectLst/>
+                          <a:latin typeface="Cambria"/>
+                          <a:ea typeface="ＭＳ 明朝"/>
+                          <a:cs typeface="Times New Roman"/>
+                        </a:rPr>
+                        <a:t>All Positive</a:t>
+                      </a:r>
+                    </a:p>
+                  </a:txBody>
+                  <a:tcPr marL="68580" marR="68580" marT="0" marB="0"/>
+                </a:tc>
+                <a:tc>
+                  <a:txBody>
+                    <a:bodyPr/>
+                    <a:lstStyle/>
+                    <a:p>
+                      <a:pPr marL="0" marR="0" algn="ctr">
+                        <a:lnSpc>
+                          <a:spcPct val="115000"/>
+                        </a:lnSpc>
+                        <a:spcBef>
+                          <a:spcPts val="0"/>
+                        </a:spcBef>
+                        <a:spcAft>
+                          <a:spcPts val="1000"/>
+                        </a:spcAft>
+                      </a:pPr>
+                      <a:r>
+                        <a:rPr lang="en-US" sz="2400">
+                          <a:effectLst/>
+                          <a:latin typeface="Cambria"/>
+                          <a:ea typeface="ＭＳ 明朝"/>
+                          <a:cs typeface="Times New Roman"/>
+                        </a:rPr>
+                        <a:t>43.4</a:t>
+                      </a:r>
+                    </a:p>
+                  </a:txBody>
+                  <a:tcPr marL="68580" marR="68580" marT="0" marB="0"/>
+                </a:tc>
+                <a:tc>
+                  <a:txBody>
+                    <a:bodyPr/>
+                    <a:lstStyle/>
+                    <a:p>
+                      <a:pPr marL="0" marR="0" algn="ctr">
+                        <a:lnSpc>
+                          <a:spcPct val="115000"/>
+                        </a:lnSpc>
+                        <a:spcBef>
+                          <a:spcPts val="0"/>
+                        </a:spcBef>
+                        <a:spcAft>
+                          <a:spcPts val="1000"/>
+                        </a:spcAft>
+                      </a:pPr>
+                      <a:r>
+                        <a:rPr lang="en-US" sz="2400">
+                          <a:effectLst/>
+                          <a:latin typeface="Cambria"/>
+                          <a:ea typeface="ＭＳ 明朝"/>
+                          <a:cs typeface="Times New Roman"/>
+                        </a:rPr>
+                        <a:t>100.0</a:t>
+                      </a:r>
+                    </a:p>
+                  </a:txBody>
+                  <a:tcPr marL="68580" marR="68580" marT="0" marB="0"/>
+                </a:tc>
+                <a:tc>
+                  <a:txBody>
+                    <a:bodyPr/>
+                    <a:lstStyle/>
+                    <a:p>
+                      <a:pPr marL="0" marR="0" algn="ctr">
+                        <a:lnSpc>
+                          <a:spcPct val="115000"/>
+                        </a:lnSpc>
+                        <a:spcBef>
+                          <a:spcPts val="0"/>
+                        </a:spcBef>
+                        <a:spcAft>
+                          <a:spcPts val="1000"/>
+                        </a:spcAft>
+                      </a:pPr>
+                      <a:r>
+                        <a:rPr lang="en-US" sz="2400" dirty="0">
+                          <a:effectLst/>
+                          <a:latin typeface="Cambria"/>
+                          <a:ea typeface="ＭＳ 明朝"/>
+                          <a:cs typeface="Times New Roman"/>
+                        </a:rPr>
+                        <a:t>60.0</a:t>
+                      </a:r>
+                    </a:p>
+                  </a:txBody>
+                  <a:tcPr marL="68580" marR="68580" marT="0" marB="0"/>
+                </a:tc>
+              </a:tr>
+            </a:tbl>
+          </a:graphicData>
+        </a:graphic>
+      </p:graphicFrame>
     </p:spTree>
   </p:cSld>
   <p:clrMapOvr>
@@ -4996,7 +6361,7 @@
   <p:timing>
     <p:tnLst>
       <p:par>
-        <p:cTn xmlns:p14="http://schemas.microsoft.com/office/powerpoint/2010/main" id="1" dur="indefinite" restart="never" nodeType="tmRoot"/>
+        <p:cTn id="1" dur="indefinite" restart="never" nodeType="tmRoot"/>
       </p:par>
     </p:tnLst>
   </p:timing>
@@ -5038,30 +6403,75 @@
             <a:pPr algn="l"/>
             <a:r>
               <a:rPr lang="en-US" dirty="0" smtClean="0"/>
-              <a:t>Evaluation (ACL 2012)</a:t>
-            </a:r>
+              <a:t>Evaluation – Cont.</a:t>
+            </a:r>
+            <a:endParaRPr lang="en-US" dirty="0"/>
+          </a:p>
+        </p:txBody>
+      </p:sp>
+      <p:sp>
+        <p:nvSpPr>
+          <p:cNvPr id="3" name="Content Placeholder 2"/>
+          <p:cNvSpPr>
+            <a:spLocks noGrp="1"/>
+          </p:cNvSpPr>
+          <p:nvPr>
+            <p:ph idx="1"/>
+          </p:nvPr>
+        </p:nvSpPr>
+        <p:spPr/>
+        <p:txBody>
+          <a:bodyPr/>
+          <a:lstStyle/>
+          <a:p>
+            <a:r>
+              <a:rPr lang="en-US" dirty="0" smtClean="0"/>
+              <a:t>ACL 2010</a:t>
+            </a:r>
+          </a:p>
+          <a:p>
+            <a:endParaRPr lang="en-US" dirty="0"/>
+          </a:p>
+          <a:p>
+            <a:endParaRPr lang="en-US" dirty="0" smtClean="0"/>
+          </a:p>
+          <a:p>
+            <a:endParaRPr lang="en-US" dirty="0"/>
+          </a:p>
+          <a:p>
+            <a:r>
+              <a:rPr lang="en-US" dirty="0" smtClean="0"/>
+              <a:t>ACL 2007</a:t>
+            </a:r>
+          </a:p>
+          <a:p>
+            <a:pPr marL="457200" lvl="1" indent="0">
+              <a:buNone/>
+            </a:pPr>
+            <a:endParaRPr lang="en-US" dirty="0" smtClean="0"/>
+          </a:p>
+          <a:p>
             <a:endParaRPr lang="en-US" dirty="0"/>
           </a:p>
         </p:txBody>
       </p:sp>
       <p:graphicFrame>
         <p:nvGraphicFramePr>
-          <p:cNvPr id="6" name="Content Placeholder 5"/>
+          <p:cNvPr id="5" name="Table 4"/>
           <p:cNvGraphicFramePr>
             <a:graphicFrameLocks noGrp="1"/>
           </p:cNvGraphicFramePr>
           <p:nvPr>
-            <p:ph idx="1"/>
             <p:extLst>
               <p:ext uri="{D42A27DB-BD31-4B8C-83A1-F6EECF244321}">
-                <p14:modId xmlns:p14="http://schemas.microsoft.com/office/powerpoint/2010/main" val="2884715640"/>
+                <p14:modId xmlns:p14="http://schemas.microsoft.com/office/powerpoint/2010/main" xmlns="" val="1303962632"/>
               </p:ext>
             </p:extLst>
           </p:nvPr>
         </p:nvGraphicFramePr>
         <p:xfrm>
-          <a:off x="381000" y="1371600"/>
-          <a:ext cx="8305800" cy="5047488"/>
+          <a:off x="609600" y="2209800"/>
+          <a:ext cx="8001000" cy="1682496"/>
         </p:xfrm>
         <a:graphic>
           <a:graphicData uri="http://schemas.openxmlformats.org/drawingml/2006/table">
@@ -5070,12 +6480,41 @@
                 <a:tableStyleId>{5C22544A-7EE6-4342-B048-85BDC9FD1C3A}</a:tableStyleId>
               </a:tblPr>
               <a:tblGrid>
-                <a:gridCol w="2286000"/>
+                <a:gridCol w="2133600"/>
                 <a:gridCol w="1866900"/>
-                <a:gridCol w="2076450"/>
-                <a:gridCol w="2076450"/>
+                <a:gridCol w="2000250"/>
+                <a:gridCol w="2000250"/>
               </a:tblGrid>
               <a:tr h="370840">
+                <a:tc>
+                  <a:txBody>
+                    <a:bodyPr/>
+                    <a:lstStyle/>
+                    <a:p>
+                      <a:pPr marL="0" marR="0" algn="l">
+                        <a:lnSpc>
+                          <a:spcPct val="115000"/>
+                        </a:lnSpc>
+                        <a:spcBef>
+                          <a:spcPts val="0"/>
+                        </a:spcBef>
+                        <a:spcAft>
+                          <a:spcPts val="1000"/>
+                        </a:spcAft>
+                      </a:pPr>
+                      <a:r>
+                        <a:rPr lang="en-US" sz="2400" dirty="0">
+                          <a:effectLst/>
+                          <a:latin typeface="Cambria"/>
+                          <a:ea typeface="ＭＳ 明朝"/>
+                          <a:cs typeface="Times New Roman"/>
+                        </a:rPr>
+                        <a:t> </a:t>
+                      </a:r>
+                    </a:p>
+                  </a:txBody>
+                  <a:tcPr marL="68580" marR="68580" marT="0" marB="0"/>
+                </a:tc>
                 <a:tc>
                   <a:txBody>
                     <a:bodyPr/>
@@ -5099,7 +6538,7 @@
                           <a:ea typeface="ＭＳ 明朝"/>
                           <a:cs typeface="Times New Roman"/>
                         </a:rPr>
-                        <a:t> </a:t>
+                        <a:t>Precision</a:t>
                       </a:r>
                       <a:endParaRPr lang="en-US" sz="2400" dirty="0">
                         <a:effectLst/>
@@ -5134,7 +6573,7 @@
                           <a:ea typeface="ＭＳ 明朝"/>
                           <a:cs typeface="Times New Roman"/>
                         </a:rPr>
-                        <a:t>Precision</a:t>
+                        <a:t>Recall</a:t>
                       </a:r>
                       <a:endParaRPr lang="en-US" sz="2400" dirty="0">
                         <a:effectLst/>
@@ -5163,20 +6602,51 @@
                         </a:spcAft>
                       </a:pPr>
                       <a:r>
-                        <a:rPr lang="en-US" sz="2400" b="1" dirty="0">
+                        <a:rPr lang="en-US" sz="2400" b="1">
                           <a:effectLst/>
                           <a:latin typeface="Cambria"/>
                           <a:ea typeface="ＭＳ 明朝"/>
                           <a:cs typeface="Times New Roman"/>
                         </a:rPr>
-                        <a:t>Recall</a:t>
-                      </a:r>
-                      <a:endParaRPr lang="en-US" sz="2400" dirty="0">
+                        <a:t>F-score</a:t>
+                      </a:r>
+                      <a:endParaRPr lang="en-US" sz="2400">
                         <a:effectLst/>
                         <a:latin typeface="Cambria"/>
                         <a:ea typeface="ＭＳ 明朝"/>
                         <a:cs typeface="Times New Roman"/>
                       </a:endParaRPr>
+                    </a:p>
+                  </a:txBody>
+                  <a:tcPr marL="68580" marR="68580" marT="0" marB="0"/>
+                </a:tc>
+              </a:tr>
+              <a:tr h="370840">
+                <a:tc>
+                  <a:txBody>
+                    <a:bodyPr/>
+                    <a:lstStyle/>
+                    <a:p>
+                      <a:pPr marL="0" marR="0" algn="l">
+                        <a:lnSpc>
+                          <a:spcPct val="115000"/>
+                        </a:lnSpc>
+                        <a:spcBef>
+                          <a:spcPts val="0"/>
+                        </a:spcBef>
+                        <a:spcAft>
+                          <a:spcPts val="1000"/>
+                        </a:spcAft>
+                      </a:pPr>
+                      <a:r>
+                        <a:rPr lang="en-US" sz="2400">
+                          <a:effectLst/>
+                          <a:latin typeface="Cambria"/>
+                          <a:ea typeface="ＭＳ 明朝"/>
+                          <a:cs typeface="Times New Roman"/>
+                        </a:rPr>
+                        <a:t>Metadata+LDA</a:t>
+                      </a:r>
                     </a:p>
                   </a:txBody>
                   <a:tcPr marL="68580" marR="68580" marT="0" marB="0"/>
@@ -5204,14 +6674,66 @@
                           <a:ea typeface="ＭＳ 明朝"/>
                           <a:cs typeface="Times New Roman"/>
                         </a:rPr>
-                        <a:t>F-score</a:t>
-                      </a:r>
-                      <a:endParaRPr lang="en-US" sz="2400" dirty="0">
-                        <a:effectLst/>
-                        <a:latin typeface="Cambria"/>
-                        <a:ea typeface="ＭＳ 明朝"/>
-                        <a:cs typeface="Times New Roman"/>
-                      </a:endParaRPr>
+                        <a:t>70.4</a:t>
+                      </a:r>
+                    </a:p>
+                  </a:txBody>
+                  <a:tcPr marL="68580" marR="68580" marT="0" marB="0"/>
+                </a:tc>
+                <a:tc>
+                  <a:txBody>
+                    <a:bodyPr/>
+                    <a:lstStyle/>
+                    <a:p>
+                      <a:pPr marL="0" marR="0" algn="ctr">
+                        <a:lnSpc>
+                          <a:spcPct val="115000"/>
+                        </a:lnSpc>
+                        <a:spcBef>
+                          <a:spcPts val="0"/>
+                        </a:spcBef>
+                        <a:spcAft>
+                          <a:spcPts val="1000"/>
+                        </a:spcAft>
+                      </a:pPr>
+                      <a:r>
+                        <a:rPr lang="en-US" sz="2400" b="1" dirty="0">
+                          <a:effectLst/>
+                          <a:latin typeface="Cambria"/>
+                          <a:ea typeface="ＭＳ 明朝"/>
+                          <a:cs typeface="Times New Roman"/>
+                        </a:rPr>
+                        <a:t>66.9</a:t>
+                      </a:r>
+                    </a:p>
+                  </a:txBody>
+                  <a:tcPr marL="68580" marR="68580" marT="0" marB="0"/>
+                </a:tc>
+                <a:tc>
+                  <a:txBody>
+                    <a:bodyPr/>
+                    <a:lstStyle/>
+                    <a:p>
+                      <a:pPr marL="0" marR="0" algn="ctr">
+                        <a:lnSpc>
+                          <a:spcPct val="115000"/>
+                        </a:lnSpc>
+                        <a:spcBef>
+                          <a:spcPts val="0"/>
+                        </a:spcBef>
+                        <a:spcAft>
+                          <a:spcPts val="1000"/>
+                        </a:spcAft>
+                      </a:pPr>
+                      <a:r>
+                        <a:rPr lang="en-US" sz="2400" b="1" dirty="0">
+                          <a:effectLst/>
+                          <a:latin typeface="Cambria"/>
+                          <a:ea typeface="ＭＳ 明朝"/>
+                          <a:cs typeface="Times New Roman"/>
+                        </a:rPr>
+                        <a:t>68.6</a:t>
+                      </a:r>
                     </a:p>
                   </a:txBody>
                   <a:tcPr marL="68580" marR="68580" marT="0" marB="0"/>
@@ -5235,13 +6757,13 @@
                         </a:spcAft>
                       </a:pPr>
                       <a:r>
-                        <a:rPr lang="en-US" sz="2400" dirty="0">
+                        <a:rPr lang="en-US" sz="2400">
                           <a:effectLst/>
                           <a:latin typeface="Cambria"/>
                           <a:ea typeface="ＭＳ 明朝"/>
                           <a:cs typeface="Times New Roman"/>
                         </a:rPr>
-                        <a:t>#Pictures</a:t>
+                        <a:t>All features</a:t>
                       </a:r>
                     </a:p>
                   </a:txBody>
@@ -5270,7 +6792,7 @@
                           <a:ea typeface="ＭＳ 明朝"/>
                           <a:cs typeface="Times New Roman"/>
                         </a:rPr>
-                        <a:t>53.0</a:t>
+                        <a:t>68.1</a:t>
                       </a:r>
                     </a:p>
                   </a:txBody>
@@ -5293,13 +6815,13 @@
                         </a:spcAft>
                       </a:pPr>
                       <a:r>
-                        <a:rPr lang="en-US" sz="2400">
+                        <a:rPr lang="en-US" sz="2400" dirty="0">
                           <a:effectLst/>
                           <a:latin typeface="Cambria"/>
                           <a:ea typeface="ＭＳ 明朝"/>
                           <a:cs typeface="Times New Roman"/>
                         </a:rPr>
-                        <a:t>39.6</a:t>
+                        <a:t>57.5</a:t>
                       </a:r>
                     </a:p>
                   </a:txBody>
@@ -5328,7 +6850,7 @@
                           <a:ea typeface="ＭＳ 明朝"/>
                           <a:cs typeface="Times New Roman"/>
                         </a:rPr>
-                        <a:t>45.4</a:t>
+                        <a:t>62.4</a:t>
                       </a:r>
                     </a:p>
                   </a:txBody>
@@ -5359,7 +6881,7 @@
                           <a:ea typeface="ＭＳ 明朝"/>
                           <a:cs typeface="Times New Roman"/>
                         </a:rPr>
-                        <a:t>#Formulas</a:t>
+                        <a:t>All Positive</a:t>
                       </a:r>
                     </a:p>
                   </a:txBody>
@@ -5382,13 +6904,13 @@
                         </a:spcAft>
                       </a:pPr>
                       <a:r>
-                        <a:rPr lang="en-US" sz="2400">
+                        <a:rPr lang="en-US" sz="2400" dirty="0">
                           <a:effectLst/>
                           <a:latin typeface="Cambria"/>
                           <a:ea typeface="ＭＳ 明朝"/>
                           <a:cs typeface="Times New Roman"/>
                         </a:rPr>
-                        <a:t>70.5</a:t>
+                        <a:t>0.35</a:t>
                       </a:r>
                     </a:p>
                   </a:txBody>
@@ -5411,13 +6933,13 @@
                         </a:spcAft>
                       </a:pPr>
                       <a:r>
-                        <a:rPr lang="en-US" sz="2400">
+                        <a:rPr lang="en-US" sz="2400" dirty="0">
                           <a:effectLst/>
                           <a:latin typeface="Cambria"/>
                           <a:ea typeface="ＭＳ 明朝"/>
                           <a:cs typeface="Times New Roman"/>
                         </a:rPr>
-                        <a:t>66.7</a:t>
+                        <a:t>100.0</a:t>
                       </a:r>
                     </a:p>
                   </a:txBody>
@@ -5440,19 +6962,59 @@
                         </a:spcAft>
                       </a:pPr>
                       <a:r>
-                        <a:rPr lang="en-US" sz="2400">
+                        <a:rPr lang="en-US" sz="2400" dirty="0" smtClean="0">
                           <a:effectLst/>
                           <a:latin typeface="Cambria"/>
                           <a:ea typeface="ＭＳ 明朝"/>
                           <a:cs typeface="Times New Roman"/>
                         </a:rPr>
-                        <a:t>68.5</a:t>
-                      </a:r>
+                        <a:t>51.9</a:t>
+                      </a:r>
+                      <a:endParaRPr lang="en-US" sz="2400" dirty="0">
+                        <a:effectLst/>
+                        <a:latin typeface="Cambria"/>
+                        <a:ea typeface="ＭＳ 明朝"/>
+                        <a:cs typeface="Times New Roman"/>
+                      </a:endParaRPr>
                     </a:p>
                   </a:txBody>
                   <a:tcPr marL="68580" marR="68580" marT="0" marB="0"/>
                 </a:tc>
               </a:tr>
+            </a:tbl>
+          </a:graphicData>
+        </a:graphic>
+      </p:graphicFrame>
+      <p:graphicFrame>
+        <p:nvGraphicFramePr>
+          <p:cNvPr id="7" name="Table 6"/>
+          <p:cNvGraphicFramePr>
+            <a:graphicFrameLocks noGrp="1"/>
+          </p:cNvGraphicFramePr>
+          <p:nvPr>
+            <p:extLst>
+              <p:ext uri="{D42A27DB-BD31-4B8C-83A1-F6EECF244321}">
+                <p14:modId xmlns:p14="http://schemas.microsoft.com/office/powerpoint/2010/main" xmlns="" val="1278740302"/>
+              </p:ext>
+            </p:extLst>
+          </p:nvPr>
+        </p:nvGraphicFramePr>
+        <p:xfrm>
+          <a:off x="609600" y="4648200"/>
+          <a:ext cx="8001000" cy="1682496"/>
+        </p:xfrm>
+        <a:graphic>
+          <a:graphicData uri="http://schemas.openxmlformats.org/drawingml/2006/table">
+            <a:tbl>
+              <a:tblPr firstRow="1" bandRow="1">
+                <a:tableStyleId>{5C22544A-7EE6-4342-B048-85BDC9FD1C3A}</a:tableStyleId>
+              </a:tblPr>
+              <a:tblGrid>
+                <a:gridCol w="2133600"/>
+                <a:gridCol w="1866900"/>
+                <a:gridCol w="2000250"/>
+                <a:gridCol w="2000250"/>
+              </a:tblGrid>
               <a:tr h="370840">
                 <a:tc>
                   <a:txBody>
@@ -5471,13 +7033,13 @@
                         </a:spcAft>
                       </a:pPr>
                       <a:r>
-                        <a:rPr lang="en-US" sz="2400">
+                        <a:rPr lang="en-US" sz="2400" dirty="0">
                           <a:effectLst/>
                           <a:latin typeface="Cambria"/>
                           <a:ea typeface="ＭＳ 明朝"/>
                           <a:cs typeface="Times New Roman"/>
                         </a:rPr>
-                        <a:t>#Tables</a:t>
+                        <a:t> </a:t>
                       </a:r>
                     </a:p>
                   </a:txBody>
@@ -5500,14 +7062,20 @@
                         </a:spcAft>
                       </a:pPr>
                       <a:r>
-                        <a:rPr lang="en-US" sz="2400">
+                        <a:rPr lang="en-US" sz="2400" b="1">
                           <a:effectLst/>
                           <a:latin typeface="Cambria"/>
                           <a:ea typeface="ＭＳ 明朝"/>
                           <a:cs typeface="Times New Roman"/>
                         </a:rPr>
-                        <a:t>72.6</a:t>
-                      </a:r>
+                        <a:t>Precision</a:t>
+                      </a:r>
+                      <a:endParaRPr lang="en-US" sz="2400">
+                        <a:effectLst/>
+                        <a:latin typeface="Cambria"/>
+                        <a:ea typeface="ＭＳ 明朝"/>
+                        <a:cs typeface="Times New Roman"/>
+                      </a:endParaRPr>
                     </a:p>
                   </a:txBody>
                   <a:tcPr marL="68580" marR="68580" marT="0" marB="0"/>
@@ -5529,14 +7097,20 @@
                         </a:spcAft>
                       </a:pPr>
                       <a:r>
-                        <a:rPr lang="en-US" sz="2400">
+                        <a:rPr lang="en-US" sz="2400" b="1">
                           <a:effectLst/>
                           <a:latin typeface="Cambria"/>
                           <a:ea typeface="ＭＳ 明朝"/>
                           <a:cs typeface="Times New Roman"/>
                         </a:rPr>
-                        <a:t>69.4</a:t>
-                      </a:r>
+                        <a:t>Recall</a:t>
+                      </a:r>
+                      <a:endParaRPr lang="en-US" sz="2400">
+                        <a:effectLst/>
+                        <a:latin typeface="Cambria"/>
+                        <a:ea typeface="ＭＳ 明朝"/>
+                        <a:cs typeface="Times New Roman"/>
+                      </a:endParaRPr>
                     </a:p>
                   </a:txBody>
                   <a:tcPr marL="68580" marR="68580" marT="0" marB="0"/>
@@ -5558,14 +7132,20 @@
                         </a:spcAft>
                       </a:pPr>
                       <a:r>
-                        <a:rPr lang="en-US" sz="2400">
+                        <a:rPr lang="en-US" sz="2400" b="1">
                           <a:effectLst/>
                           <a:latin typeface="Cambria"/>
                           <a:ea typeface="ＭＳ 明朝"/>
                           <a:cs typeface="Times New Roman"/>
                         </a:rPr>
-                        <a:t>71.0</a:t>
-                      </a:r>
+                        <a:t>F-score</a:t>
+                      </a:r>
+                      <a:endParaRPr lang="en-US" sz="2400">
+                        <a:effectLst/>
+                        <a:latin typeface="Cambria"/>
+                        <a:ea typeface="ＭＳ 明朝"/>
+                        <a:cs typeface="Times New Roman"/>
+                      </a:endParaRPr>
                     </a:p>
                   </a:txBody>
                   <a:tcPr marL="68580" marR="68580" marT="0" marB="0"/>
@@ -5595,7 +7175,7 @@
                           <a:ea typeface="ＭＳ 明朝"/>
                           <a:cs typeface="Times New Roman"/>
                         </a:rPr>
-                        <a:t>Metadata</a:t>
+                        <a:t>Metadata+LDA</a:t>
                       </a:r>
                     </a:p>
                   </a:txBody>
@@ -5618,13 +7198,13 @@
                         </a:spcAft>
                       </a:pPr>
                       <a:r>
-                        <a:rPr lang="en-US" sz="2400">
+                        <a:rPr lang="en-US" sz="2400" dirty="0">
                           <a:effectLst/>
                           <a:latin typeface="Cambria"/>
                           <a:ea typeface="ＭＳ 明朝"/>
                           <a:cs typeface="Times New Roman"/>
                         </a:rPr>
-                        <a:t>73.5</a:t>
+                        <a:t>51.0</a:t>
                       </a:r>
                     </a:p>
                   </a:txBody>
@@ -5647,13 +7227,13 @@
                         </a:spcAft>
                       </a:pPr>
                       <a:r>
-                        <a:rPr lang="en-US" sz="2400" dirty="0">
+                        <a:rPr lang="en-US" sz="2400" b="1" dirty="0">
                           <a:effectLst/>
                           <a:latin typeface="Cambria"/>
                           <a:ea typeface="ＭＳ 明朝"/>
                           <a:cs typeface="Times New Roman"/>
                         </a:rPr>
-                        <a:t>74.8</a:t>
+                        <a:t>55.6</a:t>
                       </a:r>
                     </a:p>
                   </a:txBody>
@@ -5676,13 +7256,13 @@
                         </a:spcAft>
                       </a:pPr>
                       <a:r>
-                        <a:rPr lang="en-US" sz="2400">
+                        <a:rPr lang="en-US" sz="2400" b="1" dirty="0">
                           <a:effectLst/>
                           <a:latin typeface="Cambria"/>
                           <a:ea typeface="ＭＳ 明朝"/>
                           <a:cs typeface="Times New Roman"/>
                         </a:rPr>
-                        <a:t>74.1</a:t>
+                        <a:t>53.1</a:t>
                       </a:r>
                     </a:p>
                   </a:txBody>
@@ -5707,13 +7287,13 @@
                         </a:spcAft>
                       </a:pPr>
                       <a:r>
-                        <a:rPr lang="en-US" sz="2400">
+                        <a:rPr lang="en-US" sz="2400" dirty="0">
                           <a:effectLst/>
                           <a:latin typeface="Cambria"/>
                           <a:ea typeface="ＭＳ 明朝"/>
                           <a:cs typeface="Times New Roman"/>
                         </a:rPr>
-                        <a:t>Title</a:t>
+                        <a:t>All features</a:t>
                       </a:r>
                     </a:p>
                   </a:txBody>
@@ -5736,13 +7316,13 @@
                         </a:spcAft>
                       </a:pPr>
                       <a:r>
-                        <a:rPr lang="en-US" sz="2400">
+                        <a:rPr lang="en-US" sz="2400" b="1" dirty="0">
                           <a:effectLst/>
                           <a:latin typeface="Cambria"/>
                           <a:ea typeface="ＭＳ 明朝"/>
                           <a:cs typeface="Times New Roman"/>
                         </a:rPr>
-                        <a:t>64.3</a:t>
+                        <a:t>54.4</a:t>
                       </a:r>
                     </a:p>
                   </a:txBody>
@@ -5765,13 +7345,13 @@
                         </a:spcAft>
                       </a:pPr>
                       <a:r>
-                        <a:rPr lang="en-US" sz="2400">
+                        <a:rPr lang="en-US" sz="2400" dirty="0">
                           <a:effectLst/>
                           <a:latin typeface="Cambria"/>
                           <a:ea typeface="ＭＳ 明朝"/>
                           <a:cs typeface="Times New Roman"/>
                         </a:rPr>
-                        <a:t>56.8</a:t>
+                        <a:t>50.5</a:t>
                       </a:r>
                     </a:p>
                   </a:txBody>
@@ -5794,13 +7374,13 @@
                         </a:spcAft>
                       </a:pPr>
                       <a:r>
-                        <a:rPr lang="en-US" sz="2400">
+                        <a:rPr lang="en-US" sz="2400" dirty="0">
                           <a:effectLst/>
                           <a:latin typeface="Cambria"/>
                           <a:ea typeface="ＭＳ 明朝"/>
                           <a:cs typeface="Times New Roman"/>
                         </a:rPr>
-                        <a:t>60.2</a:t>
+                        <a:t>52.3</a:t>
                       </a:r>
                     </a:p>
                   </a:txBody>
@@ -5831,7 +7411,7 @@
                           <a:ea typeface="ＭＳ 明朝"/>
                           <a:cs typeface="Times New Roman"/>
                         </a:rPr>
-                        <a:t>LDA Topic</a:t>
+                        <a:t>All Positive</a:t>
                       </a:r>
                     </a:p>
                   </a:txBody>
@@ -5854,13 +7434,13 @@
                         </a:spcAft>
                       </a:pPr>
                       <a:r>
-                        <a:rPr lang="en-US" sz="2400" dirty="0">
+                        <a:rPr lang="en-US" sz="2400">
                           <a:effectLst/>
                           <a:latin typeface="Cambria"/>
                           <a:ea typeface="ＭＳ 明朝"/>
                           <a:cs typeface="Times New Roman"/>
                         </a:rPr>
-                        <a:t>78.5</a:t>
+                        <a:t>27.0</a:t>
                       </a:r>
                     </a:p>
                   </a:txBody>
@@ -5889,7 +7469,7 @@
                           <a:ea typeface="ＭＳ 明朝"/>
                           <a:cs typeface="Times New Roman"/>
                         </a:rPr>
-                        <a:t>75.6</a:t>
+                        <a:t>100.0</a:t>
                       </a:r>
                     </a:p>
                   </a:txBody>
@@ -5912,618 +7492,13 @@
                         </a:spcAft>
                       </a:pPr>
                       <a:r>
-                        <a:rPr lang="en-US" sz="2400">
-                          <a:effectLst/>
-                          <a:latin typeface="Cambria"/>
-                          <a:ea typeface="ＭＳ 明朝"/>
-                          <a:cs typeface="Times New Roman"/>
-                        </a:rPr>
-                        <a:t>77.1</a:t>
-                      </a:r>
-                    </a:p>
-                  </a:txBody>
-                  <a:tcPr marL="68580" marR="68580" marT="0" marB="0"/>
-                </a:tc>
-              </a:tr>
-              <a:tr h="370840">
-                <a:tc>
-                  <a:txBody>
-                    <a:bodyPr/>
-                    <a:lstStyle/>
-                    <a:p>
-                      <a:pPr marL="0" marR="0" algn="l">
-                        <a:lnSpc>
-                          <a:spcPct val="115000"/>
-                        </a:lnSpc>
-                        <a:spcBef>
-                          <a:spcPts val="0"/>
-                        </a:spcBef>
-                        <a:spcAft>
-                          <a:spcPts val="1000"/>
-                        </a:spcAft>
-                      </a:pPr>
-                      <a:r>
                         <a:rPr lang="en-US" sz="2400" dirty="0">
                           <a:effectLst/>
                           <a:latin typeface="Cambria"/>
                           <a:ea typeface="ＭＳ 明朝"/>
                           <a:cs typeface="Times New Roman"/>
                         </a:rPr>
-                        <a:t>Popular </a:t>
-                      </a:r>
-                      <a:r>
-                        <a:rPr lang="en-US" sz="2400" dirty="0" smtClean="0">
-                          <a:effectLst/>
-                          <a:latin typeface="Cambria"/>
-                          <a:ea typeface="ＭＳ 明朝"/>
-                          <a:cs typeface="Times New Roman"/>
-                        </a:rPr>
-                        <a:t>Tech.</a:t>
-                      </a:r>
-                      <a:endParaRPr lang="en-US" sz="2400" dirty="0">
-                        <a:effectLst/>
-                        <a:latin typeface="Cambria"/>
-                        <a:ea typeface="ＭＳ 明朝"/>
-                        <a:cs typeface="Times New Roman"/>
-                      </a:endParaRPr>
-                    </a:p>
-                  </a:txBody>
-                  <a:tcPr marL="68580" marR="68580" marT="0" marB="0"/>
-                </a:tc>
-                <a:tc>
-                  <a:txBody>
-                    <a:bodyPr/>
-                    <a:lstStyle/>
-                    <a:p>
-                      <a:pPr marL="0" marR="0" algn="ctr">
-                        <a:lnSpc>
-                          <a:spcPct val="115000"/>
-                        </a:lnSpc>
-                        <a:spcBef>
-                          <a:spcPts val="0"/>
-                        </a:spcBef>
-                        <a:spcAft>
-                          <a:spcPts val="1000"/>
-                        </a:spcAft>
-                      </a:pPr>
-                      <a:r>
-                        <a:rPr lang="en-US" sz="2400">
-                          <a:effectLst/>
-                          <a:latin typeface="Cambria"/>
-                          <a:ea typeface="ＭＳ 明朝"/>
-                          <a:cs typeface="Times New Roman"/>
-                        </a:rPr>
-                        <a:t>53.0</a:t>
-                      </a:r>
-                    </a:p>
-                  </a:txBody>
-                  <a:tcPr marL="68580" marR="68580" marT="0" marB="0"/>
-                </a:tc>
-                <a:tc>
-                  <a:txBody>
-                    <a:bodyPr/>
-                    <a:lstStyle/>
-                    <a:p>
-                      <a:pPr marL="0" marR="0" algn="ctr">
-                        <a:lnSpc>
-                          <a:spcPct val="115000"/>
-                        </a:lnSpc>
-                        <a:spcBef>
-                          <a:spcPts val="0"/>
-                        </a:spcBef>
-                        <a:spcAft>
-                          <a:spcPts val="1000"/>
-                        </a:spcAft>
-                      </a:pPr>
-                      <a:r>
-                        <a:rPr lang="en-US" sz="2400">
-                          <a:effectLst/>
-                          <a:latin typeface="Cambria"/>
-                          <a:ea typeface="ＭＳ 明朝"/>
-                          <a:cs typeface="Times New Roman"/>
-                        </a:rPr>
-                        <a:t>40.5</a:t>
-                      </a:r>
-                    </a:p>
-                  </a:txBody>
-                  <a:tcPr marL="68580" marR="68580" marT="0" marB="0"/>
-                </a:tc>
-                <a:tc>
-                  <a:txBody>
-                    <a:bodyPr/>
-                    <a:lstStyle/>
-                    <a:p>
-                      <a:pPr marL="0" marR="0" algn="ctr">
-                        <a:lnSpc>
-                          <a:spcPct val="115000"/>
-                        </a:lnSpc>
-                        <a:spcBef>
-                          <a:spcPts val="0"/>
-                        </a:spcBef>
-                        <a:spcAft>
-                          <a:spcPts val="1000"/>
-                        </a:spcAft>
-                      </a:pPr>
-                      <a:r>
-                        <a:rPr lang="en-US" sz="2400">
-                          <a:effectLst/>
-                          <a:latin typeface="Cambria"/>
-                          <a:ea typeface="ＭＳ 明朝"/>
-                          <a:cs typeface="Times New Roman"/>
-                        </a:rPr>
-                        <a:t>46.0</a:t>
-                      </a:r>
-                    </a:p>
-                  </a:txBody>
-                  <a:tcPr marL="68580" marR="68580" marT="0" marB="0"/>
-                </a:tc>
-              </a:tr>
-              <a:tr h="370840">
-                <a:tc>
-                  <a:txBody>
-                    <a:bodyPr/>
-                    <a:lstStyle/>
-                    <a:p>
-                      <a:pPr marL="0" marR="0" algn="l">
-                        <a:lnSpc>
-                          <a:spcPct val="115000"/>
-                        </a:lnSpc>
-                        <a:spcBef>
-                          <a:spcPts val="0"/>
-                        </a:spcBef>
-                        <a:spcAft>
-                          <a:spcPts val="1000"/>
-                        </a:spcAft>
-                      </a:pPr>
-                      <a:r>
-                        <a:rPr lang="en-US" sz="2400">
-                          <a:effectLst/>
-                          <a:latin typeface="Cambria"/>
-                          <a:ea typeface="ＭＳ 明朝"/>
-                          <a:cs typeface="Times New Roman"/>
-                        </a:rPr>
-                        <a:t>Author Ranking</a:t>
-                      </a:r>
-                    </a:p>
-                  </a:txBody>
-                  <a:tcPr marL="68580" marR="68580" marT="0" marB="0"/>
-                </a:tc>
-                <a:tc>
-                  <a:txBody>
-                    <a:bodyPr/>
-                    <a:lstStyle/>
-                    <a:p>
-                      <a:pPr marL="0" marR="0" algn="ctr">
-                        <a:lnSpc>
-                          <a:spcPct val="115000"/>
-                        </a:lnSpc>
-                        <a:spcBef>
-                          <a:spcPts val="0"/>
-                        </a:spcBef>
-                        <a:spcAft>
-                          <a:spcPts val="1000"/>
-                        </a:spcAft>
-                      </a:pPr>
-                      <a:r>
-                        <a:rPr lang="en-US" sz="2400">
-                          <a:effectLst/>
-                          <a:latin typeface="Cambria"/>
-                          <a:ea typeface="ＭＳ 明朝"/>
-                          <a:cs typeface="Times New Roman"/>
-                        </a:rPr>
-                        <a:t>40.3</a:t>
-                      </a:r>
-                    </a:p>
-                  </a:txBody>
-                  <a:tcPr marL="68580" marR="68580" marT="0" marB="0"/>
-                </a:tc>
-                <a:tc>
-                  <a:txBody>
-                    <a:bodyPr/>
-                    <a:lstStyle/>
-                    <a:p>
-                      <a:pPr marL="0" marR="0" algn="ctr">
-                        <a:lnSpc>
-                          <a:spcPct val="115000"/>
-                        </a:lnSpc>
-                        <a:spcBef>
-                          <a:spcPts val="0"/>
-                        </a:spcBef>
-                        <a:spcAft>
-                          <a:spcPts val="1000"/>
-                        </a:spcAft>
-                      </a:pPr>
-                      <a:r>
-                        <a:rPr lang="en-US" sz="2400">
-                          <a:effectLst/>
-                          <a:latin typeface="Cambria"/>
-                          <a:ea typeface="ＭＳ 明朝"/>
-                          <a:cs typeface="Times New Roman"/>
-                        </a:rPr>
-                        <a:t>71.2</a:t>
-                      </a:r>
-                    </a:p>
-                  </a:txBody>
-                  <a:tcPr marL="68580" marR="68580" marT="0" marB="0"/>
-                </a:tc>
-                <a:tc>
-                  <a:txBody>
-                    <a:bodyPr/>
-                    <a:lstStyle/>
-                    <a:p>
-                      <a:pPr marL="0" marR="0" algn="ctr">
-                        <a:lnSpc>
-                          <a:spcPct val="115000"/>
-                        </a:lnSpc>
-                        <a:spcBef>
-                          <a:spcPts val="0"/>
-                        </a:spcBef>
-                        <a:spcAft>
-                          <a:spcPts val="1000"/>
-                        </a:spcAft>
-                      </a:pPr>
-                      <a:r>
-                        <a:rPr lang="en-US" sz="2400">
-                          <a:effectLst/>
-                          <a:latin typeface="Cambria"/>
-                          <a:ea typeface="ＭＳ 明朝"/>
-                          <a:cs typeface="Times New Roman"/>
-                        </a:rPr>
-                        <a:t>52.5</a:t>
-                      </a:r>
-                    </a:p>
-                  </a:txBody>
-                  <a:tcPr marL="68580" marR="68580" marT="0" marB="0"/>
-                </a:tc>
-              </a:tr>
-              <a:tr h="370840">
-                <a:tc>
-                  <a:txBody>
-                    <a:bodyPr/>
-                    <a:lstStyle/>
-                    <a:p>
-                      <a:pPr marL="0" marR="0" algn="l">
-                        <a:lnSpc>
-                          <a:spcPct val="115000"/>
-                        </a:lnSpc>
-                        <a:spcBef>
-                          <a:spcPts val="0"/>
-                        </a:spcBef>
-                        <a:spcAft>
-                          <a:spcPts val="1000"/>
-                        </a:spcAft>
-                      </a:pPr>
-                      <a:r>
-                        <a:rPr lang="en-US" sz="2400">
-                          <a:effectLst/>
-                          <a:latin typeface="Cambria"/>
-                          <a:ea typeface="ＭＳ 明朝"/>
-                          <a:cs typeface="Times New Roman"/>
-                        </a:rPr>
-                        <a:t>Metadata+LDA</a:t>
-                      </a:r>
-                    </a:p>
-                  </a:txBody>
-                  <a:tcPr marL="68580" marR="68580" marT="0" marB="0"/>
-                </a:tc>
-                <a:tc>
-                  <a:txBody>
-                    <a:bodyPr/>
-                    <a:lstStyle/>
-                    <a:p>
-                      <a:pPr marL="0" marR="0" algn="ctr">
-                        <a:lnSpc>
-                          <a:spcPct val="115000"/>
-                        </a:lnSpc>
-                        <a:spcBef>
-                          <a:spcPts val="0"/>
-                        </a:spcBef>
-                        <a:spcAft>
-                          <a:spcPts val="1000"/>
-                        </a:spcAft>
-                      </a:pPr>
-                      <a:r>
-                        <a:rPr lang="en-US" sz="2400">
-                          <a:effectLst/>
-                          <a:latin typeface="Cambria"/>
-                          <a:ea typeface="ＭＳ 明朝"/>
-                          <a:cs typeface="Times New Roman"/>
-                        </a:rPr>
-                        <a:t>81.4</a:t>
-                      </a:r>
-                    </a:p>
-                  </a:txBody>
-                  <a:tcPr marL="68580" marR="68580" marT="0" marB="0"/>
-                </a:tc>
-                <a:tc>
-                  <a:txBody>
-                    <a:bodyPr/>
-                    <a:lstStyle/>
-                    <a:p>
-                      <a:pPr marL="0" marR="0" algn="ctr">
-                        <a:lnSpc>
-                          <a:spcPct val="115000"/>
-                        </a:lnSpc>
-                        <a:spcBef>
-                          <a:spcPts val="0"/>
-                        </a:spcBef>
-                        <a:spcAft>
-                          <a:spcPts val="1000"/>
-                        </a:spcAft>
-                      </a:pPr>
-                      <a:r>
-                        <a:rPr lang="en-US" sz="2400" b="1" dirty="0">
-                          <a:effectLst/>
-                          <a:latin typeface="Cambria"/>
-                          <a:ea typeface="ＭＳ 明朝"/>
-                          <a:cs typeface="Times New Roman"/>
-                        </a:rPr>
-                        <a:t>82.9</a:t>
-                      </a:r>
-                    </a:p>
-                  </a:txBody>
-                  <a:tcPr marL="68580" marR="68580" marT="0" marB="0"/>
-                </a:tc>
-                <a:tc>
-                  <a:txBody>
-                    <a:bodyPr/>
-                    <a:lstStyle/>
-                    <a:p>
-                      <a:pPr marL="0" marR="0" algn="ctr">
-                        <a:lnSpc>
-                          <a:spcPct val="115000"/>
-                        </a:lnSpc>
-                        <a:spcBef>
-                          <a:spcPts val="0"/>
-                        </a:spcBef>
-                        <a:spcAft>
-                          <a:spcPts val="1000"/>
-                        </a:spcAft>
-                      </a:pPr>
-                      <a:r>
-                        <a:rPr lang="en-US" sz="2400" b="1" dirty="0">
-                          <a:effectLst/>
-                          <a:latin typeface="Cambria"/>
-                          <a:ea typeface="ＭＳ 明朝"/>
-                          <a:cs typeface="Times New Roman"/>
-                        </a:rPr>
-                        <a:t>82.1</a:t>
-                      </a:r>
-                    </a:p>
-                  </a:txBody>
-                  <a:tcPr marL="68580" marR="68580" marT="0" marB="0"/>
-                </a:tc>
-              </a:tr>
-              <a:tr h="370840">
-                <a:tc>
-                  <a:txBody>
-                    <a:bodyPr/>
-                    <a:lstStyle/>
-                    <a:p>
-                      <a:pPr marL="0" marR="0" algn="l">
-                        <a:lnSpc>
-                          <a:spcPct val="115000"/>
-                        </a:lnSpc>
-                        <a:spcBef>
-                          <a:spcPts val="0"/>
-                        </a:spcBef>
-                        <a:spcAft>
-                          <a:spcPts val="1000"/>
-                        </a:spcAft>
-                      </a:pPr>
-                      <a:r>
-                        <a:rPr lang="en-US" sz="2400">
-                          <a:effectLst/>
-                          <a:latin typeface="Cambria"/>
-                          <a:ea typeface="ＭＳ 明朝"/>
-                          <a:cs typeface="Times New Roman"/>
-                        </a:rPr>
-                        <a:t>All features</a:t>
-                      </a:r>
-                    </a:p>
-                  </a:txBody>
-                  <a:tcPr marL="68580" marR="68580" marT="0" marB="0"/>
-                </a:tc>
-                <a:tc>
-                  <a:txBody>
-                    <a:bodyPr/>
-                    <a:lstStyle/>
-                    <a:p>
-                      <a:pPr marL="0" marR="0" algn="ctr">
-                        <a:lnSpc>
-                          <a:spcPct val="115000"/>
-                        </a:lnSpc>
-                        <a:spcBef>
-                          <a:spcPts val="0"/>
-                        </a:spcBef>
-                        <a:spcAft>
-                          <a:spcPts val="1000"/>
-                        </a:spcAft>
-                      </a:pPr>
-                      <a:r>
-                        <a:rPr lang="en-US" sz="2400" b="1" dirty="0">
-                          <a:effectLst/>
-                          <a:latin typeface="Cambria"/>
-                          <a:ea typeface="ＭＳ 明朝"/>
-                          <a:cs typeface="Times New Roman"/>
-                        </a:rPr>
-                        <a:t>85.0</a:t>
-                      </a:r>
-                    </a:p>
-                  </a:txBody>
-                  <a:tcPr marL="68580" marR="68580" marT="0" marB="0"/>
-                </a:tc>
-                <a:tc>
-                  <a:txBody>
-                    <a:bodyPr/>
-                    <a:lstStyle/>
-                    <a:p>
-                      <a:pPr marL="0" marR="0" algn="ctr">
-                        <a:lnSpc>
-                          <a:spcPct val="115000"/>
-                        </a:lnSpc>
-                        <a:spcBef>
-                          <a:spcPts val="0"/>
-                        </a:spcBef>
-                        <a:spcAft>
-                          <a:spcPts val="1000"/>
-                        </a:spcAft>
-                      </a:pPr>
-                      <a:r>
-                        <a:rPr lang="en-US" sz="2400">
-                          <a:effectLst/>
-                          <a:latin typeface="Cambria"/>
-                          <a:ea typeface="ＭＳ 明朝"/>
-                          <a:cs typeface="Times New Roman"/>
-                        </a:rPr>
-                        <a:t>76.6</a:t>
-                      </a:r>
-                    </a:p>
-                  </a:txBody>
-                  <a:tcPr marL="68580" marR="68580" marT="0" marB="0"/>
-                </a:tc>
-                <a:tc>
-                  <a:txBody>
-                    <a:bodyPr/>
-                    <a:lstStyle/>
-                    <a:p>
-                      <a:pPr marL="0" marR="0" algn="ctr">
-                        <a:lnSpc>
-                          <a:spcPct val="115000"/>
-                        </a:lnSpc>
-                        <a:spcBef>
-                          <a:spcPts val="0"/>
-                        </a:spcBef>
-                        <a:spcAft>
-                          <a:spcPts val="1000"/>
-                        </a:spcAft>
-                      </a:pPr>
-                      <a:r>
-                        <a:rPr lang="en-US" sz="2400">
-                          <a:effectLst/>
-                          <a:latin typeface="Cambria"/>
-                          <a:ea typeface="ＭＳ 明朝"/>
-                          <a:cs typeface="Times New Roman"/>
-                        </a:rPr>
-                        <a:t>80.6</a:t>
-                      </a:r>
-                    </a:p>
-                  </a:txBody>
-                  <a:tcPr marL="68580" marR="68580" marT="0" marB="0"/>
-                </a:tc>
-              </a:tr>
-              <a:tr h="370840">
-                <a:tc>
-                  <a:txBody>
-                    <a:bodyPr/>
-                    <a:lstStyle/>
-                    <a:p>
-                      <a:pPr marL="0" marR="0" algn="l">
-                        <a:lnSpc>
-                          <a:spcPct val="115000"/>
-                        </a:lnSpc>
-                        <a:spcBef>
-                          <a:spcPts val="0"/>
-                        </a:spcBef>
-                        <a:spcAft>
-                          <a:spcPts val="1000"/>
-                        </a:spcAft>
-                      </a:pPr>
-                      <a:r>
-                        <a:rPr lang="en-US" sz="2400">
-                          <a:effectLst/>
-                          <a:latin typeface="Cambria"/>
-                          <a:ea typeface="ＭＳ 明朝"/>
-                          <a:cs typeface="Times New Roman"/>
-                        </a:rPr>
-                        <a:t>All Positive</a:t>
-                      </a:r>
-                    </a:p>
-                  </a:txBody>
-                  <a:tcPr marL="68580" marR="68580" marT="0" marB="0"/>
-                </a:tc>
-                <a:tc>
-                  <a:txBody>
-                    <a:bodyPr/>
-                    <a:lstStyle/>
-                    <a:p>
-                      <a:pPr marL="0" marR="0" algn="ctr">
-                        <a:lnSpc>
-                          <a:spcPct val="115000"/>
-                        </a:lnSpc>
-                        <a:spcBef>
-                          <a:spcPts val="0"/>
-                        </a:spcBef>
-                        <a:spcAft>
-                          <a:spcPts val="1000"/>
-                        </a:spcAft>
-                      </a:pPr>
-                      <a:r>
-                        <a:rPr lang="en-US" sz="2400">
-                          <a:effectLst/>
-                          <a:latin typeface="Cambria"/>
-                          <a:ea typeface="ＭＳ 明朝"/>
-                          <a:cs typeface="Times New Roman"/>
-                        </a:rPr>
-                        <a:t>43.4</a:t>
-                      </a:r>
-                    </a:p>
-                  </a:txBody>
-                  <a:tcPr marL="68580" marR="68580" marT="0" marB="0"/>
-                </a:tc>
-                <a:tc>
-                  <a:txBody>
-                    <a:bodyPr/>
-                    <a:lstStyle/>
-                    <a:p>
-                      <a:pPr marL="0" marR="0" algn="ctr">
-                        <a:lnSpc>
-                          <a:spcPct val="115000"/>
-                        </a:lnSpc>
-                        <a:spcBef>
-                          <a:spcPts val="0"/>
-                        </a:spcBef>
-                        <a:spcAft>
-                          <a:spcPts val="1000"/>
-                        </a:spcAft>
-                      </a:pPr>
-                      <a:r>
-                        <a:rPr lang="en-US" sz="2400">
-                          <a:effectLst/>
-                          <a:latin typeface="Cambria"/>
-                          <a:ea typeface="ＭＳ 明朝"/>
-                          <a:cs typeface="Times New Roman"/>
-                        </a:rPr>
-                        <a:t>100.0</a:t>
-                      </a:r>
-                    </a:p>
-                  </a:txBody>
-                  <a:tcPr marL="68580" marR="68580" marT="0" marB="0"/>
-                </a:tc>
-                <a:tc>
-                  <a:txBody>
-                    <a:bodyPr/>
-                    <a:lstStyle/>
-                    <a:p>
-                      <a:pPr marL="0" marR="0" algn="ctr">
-                        <a:lnSpc>
-                          <a:spcPct val="115000"/>
-                        </a:lnSpc>
-                        <a:spcBef>
-                          <a:spcPts val="0"/>
-                        </a:spcBef>
-                        <a:spcAft>
-                          <a:spcPts val="1000"/>
-                        </a:spcAft>
-                      </a:pPr>
-                      <a:r>
-                        <a:rPr lang="en-US" sz="2400" dirty="0">
-                          <a:effectLst/>
-                          <a:latin typeface="Cambria"/>
-                          <a:ea typeface="ＭＳ 明朝"/>
-                          <a:cs typeface="Times New Roman"/>
-                        </a:rPr>
-                        <a:t>60.0</a:t>
+                        <a:t>42.5</a:t>
                       </a:r>
                     </a:p>
                   </a:txBody>
@@ -6542,7 +7517,7 @@
   <p:timing>
     <p:tnLst>
       <p:par>
-        <p:cTn xmlns:p14="http://schemas.microsoft.com/office/powerpoint/2010/main" id="1" dur="indefinite" restart="never" nodeType="tmRoot"/>
+        <p:cTn id="1" dur="indefinite" restart="never" nodeType="tmRoot"/>
       </p:par>
     </p:tnLst>
   </p:timing>
@@ -6584,7 +7559,7 @@
             <a:pPr algn="l"/>
             <a:r>
               <a:rPr lang="en-US" dirty="0" smtClean="0"/>
-              <a:t>Evaluation – Cont.</a:t>
+              <a:t>Discussion and Conclusion</a:t>
             </a:r>
             <a:endParaRPr lang="en-US" dirty="0"/>
           </a:p>
@@ -6602,1094 +7577,37 @@
         </p:nvSpPr>
         <p:spPr/>
         <p:txBody>
-          <a:bodyPr/>
+          <a:bodyPr>
+            <a:normAutofit lnSpcReduction="10000"/>
+          </a:bodyPr>
           <a:lstStyle/>
           <a:p>
             <a:r>
               <a:rPr lang="en-US" dirty="0" smtClean="0"/>
-              <a:t>ACL 2010</a:t>
-            </a:r>
-          </a:p>
-          <a:p>
+              <a:t>The model can predicts whether the paper is published in ACL or not with good accuracy.</a:t>
+            </a:r>
+          </a:p>
+          <a:p>
+            <a:r>
+              <a:rPr lang="en-US" dirty="0" smtClean="0"/>
+              <a:t>The metadata and the topic distribution learned by LDA model are the best features.</a:t>
+            </a:r>
+          </a:p>
+          <a:p>
+            <a:r>
+              <a:rPr lang="en-US" dirty="0" smtClean="0"/>
+              <a:t>It seems that the model works better on a more balanced dataset than on a less balanced one.</a:t>
+            </a:r>
+          </a:p>
+          <a:p>
+            <a:r>
+              <a:rPr lang="en-US" dirty="0" smtClean="0"/>
+              <a:t>We plan to study how the topic/style of papers changes over the time. </a:t>
+            </a:r>
             <a:endParaRPr lang="en-US" dirty="0"/>
           </a:p>
-          <a:p>
-            <a:endParaRPr lang="en-US" dirty="0" smtClean="0"/>
-          </a:p>
-          <a:p>
-            <a:endParaRPr lang="en-US" dirty="0"/>
-          </a:p>
-          <a:p>
-            <a:r>
-              <a:rPr lang="en-US" dirty="0" smtClean="0"/>
-              <a:t>ACL 2007</a:t>
-            </a:r>
-          </a:p>
-          <a:p>
-            <a:pPr marL="457200" lvl="1" indent="0">
-              <a:buNone/>
-            </a:pPr>
-            <a:endParaRPr lang="en-US" dirty="0" smtClean="0"/>
-          </a:p>
-          <a:p>
-            <a:endParaRPr lang="en-US" dirty="0"/>
-          </a:p>
-        </p:txBody>
-      </p:sp>
-      <p:graphicFrame>
-        <p:nvGraphicFramePr>
-          <p:cNvPr id="5" name="Table 4"/>
-          <p:cNvGraphicFramePr>
-            <a:graphicFrameLocks noGrp="1"/>
-          </p:cNvGraphicFramePr>
-          <p:nvPr>
-            <p:extLst>
-              <p:ext uri="{D42A27DB-BD31-4B8C-83A1-F6EECF244321}">
-                <p14:modId xmlns:p14="http://schemas.microsoft.com/office/powerpoint/2010/main" val="1303962632"/>
-              </p:ext>
-            </p:extLst>
-          </p:nvPr>
-        </p:nvGraphicFramePr>
-        <p:xfrm>
-          <a:off x="609600" y="2209800"/>
-          <a:ext cx="8001000" cy="1682496"/>
-        </p:xfrm>
-        <a:graphic>
-          <a:graphicData uri="http://schemas.openxmlformats.org/drawingml/2006/table">
-            <a:tbl>
-              <a:tblPr firstRow="1" bandRow="1">
-                <a:tableStyleId>{5C22544A-7EE6-4342-B048-85BDC9FD1C3A}</a:tableStyleId>
-              </a:tblPr>
-              <a:tblGrid>
-                <a:gridCol w="2133600"/>
-                <a:gridCol w="1866900"/>
-                <a:gridCol w="2000250"/>
-                <a:gridCol w="2000250"/>
-              </a:tblGrid>
-              <a:tr h="370840">
-                <a:tc>
-                  <a:txBody>
-                    <a:bodyPr/>
-                    <a:lstStyle/>
-                    <a:p>
-                      <a:pPr marL="0" marR="0" algn="l">
-                        <a:lnSpc>
-                          <a:spcPct val="115000"/>
-                        </a:lnSpc>
-                        <a:spcBef>
-                          <a:spcPts val="0"/>
-                        </a:spcBef>
-                        <a:spcAft>
-                          <a:spcPts val="1000"/>
-                        </a:spcAft>
-                      </a:pPr>
-                      <a:r>
-                        <a:rPr lang="en-US" sz="2400" dirty="0">
-                          <a:effectLst/>
-                          <a:latin typeface="Cambria"/>
-                          <a:ea typeface="ＭＳ 明朝"/>
-                          <a:cs typeface="Times New Roman"/>
-                        </a:rPr>
-                        <a:t> </a:t>
-                      </a:r>
-                    </a:p>
-                  </a:txBody>
-                  <a:tcPr marL="68580" marR="68580" marT="0" marB="0"/>
-                </a:tc>
-                <a:tc>
-                  <a:txBody>
-                    <a:bodyPr/>
-                    <a:lstStyle/>
-                    <a:p>
-                      <a:pPr marL="0" marR="0" algn="ctr">
-                        <a:lnSpc>
-                          <a:spcPct val="115000"/>
-                        </a:lnSpc>
-                        <a:spcBef>
-                          <a:spcPts val="0"/>
-                        </a:spcBef>
-                        <a:spcAft>
-                          <a:spcPts val="1000"/>
-                        </a:spcAft>
-                      </a:pPr>
-                      <a:r>
-                        <a:rPr lang="en-US" sz="2400" b="1" dirty="0">
-                          <a:effectLst/>
-                          <a:latin typeface="Cambria"/>
-                          <a:ea typeface="ＭＳ 明朝"/>
-                          <a:cs typeface="Times New Roman"/>
-                        </a:rPr>
-                        <a:t>Precision</a:t>
-                      </a:r>
-                      <a:endParaRPr lang="en-US" sz="2400" dirty="0">
-                        <a:effectLst/>
-                        <a:latin typeface="Cambria"/>
-                        <a:ea typeface="ＭＳ 明朝"/>
-                        <a:cs typeface="Times New Roman"/>
-                      </a:endParaRPr>
-                    </a:p>
-                  </a:txBody>
-                  <a:tcPr marL="68580" marR="68580" marT="0" marB="0"/>
-                </a:tc>
-                <a:tc>
-                  <a:txBody>
-                    <a:bodyPr/>
-                    <a:lstStyle/>
-                    <a:p>
-                      <a:pPr marL="0" marR="0" algn="ctr">
-                        <a:lnSpc>
-                          <a:spcPct val="115000"/>
-                        </a:lnSpc>
-                        <a:spcBef>
-                          <a:spcPts val="0"/>
-                        </a:spcBef>
-                        <a:spcAft>
-                          <a:spcPts val="1000"/>
-                        </a:spcAft>
-                      </a:pPr>
-                      <a:r>
-                        <a:rPr lang="en-US" sz="2400" b="1" dirty="0">
-                          <a:effectLst/>
-                          <a:latin typeface="Cambria"/>
-                          <a:ea typeface="ＭＳ 明朝"/>
-                          <a:cs typeface="Times New Roman"/>
-                        </a:rPr>
-                        <a:t>Recall</a:t>
-                      </a:r>
-                      <a:endParaRPr lang="en-US" sz="2400" dirty="0">
-                        <a:effectLst/>
-                        <a:latin typeface="Cambria"/>
-                        <a:ea typeface="ＭＳ 明朝"/>
-                        <a:cs typeface="Times New Roman"/>
-                      </a:endParaRPr>
-                    </a:p>
-                  </a:txBody>
-                  <a:tcPr marL="68580" marR="68580" marT="0" marB="0"/>
-                </a:tc>
-                <a:tc>
-                  <a:txBody>
-                    <a:bodyPr/>
-                    <a:lstStyle/>
-                    <a:p>
-                      <a:pPr marL="0" marR="0" algn="ctr">
-                        <a:lnSpc>
-                          <a:spcPct val="115000"/>
-                        </a:lnSpc>
-                        <a:spcBef>
-                          <a:spcPts val="0"/>
-                        </a:spcBef>
-                        <a:spcAft>
-                          <a:spcPts val="1000"/>
-                        </a:spcAft>
-                      </a:pPr>
-                      <a:r>
-                        <a:rPr lang="en-US" sz="2400" b="1">
-                          <a:effectLst/>
-                          <a:latin typeface="Cambria"/>
-                          <a:ea typeface="ＭＳ 明朝"/>
-                          <a:cs typeface="Times New Roman"/>
-                        </a:rPr>
-                        <a:t>F-score</a:t>
-                      </a:r>
-                      <a:endParaRPr lang="en-US" sz="2400">
-                        <a:effectLst/>
-                        <a:latin typeface="Cambria"/>
-                        <a:ea typeface="ＭＳ 明朝"/>
-                        <a:cs typeface="Times New Roman"/>
-                      </a:endParaRPr>
-                    </a:p>
-                  </a:txBody>
-                  <a:tcPr marL="68580" marR="68580" marT="0" marB="0"/>
-                </a:tc>
-              </a:tr>
-              <a:tr h="370840">
-                <a:tc>
-                  <a:txBody>
-                    <a:bodyPr/>
-                    <a:lstStyle/>
-                    <a:p>
-                      <a:pPr marL="0" marR="0" algn="l">
-                        <a:lnSpc>
-                          <a:spcPct val="115000"/>
-                        </a:lnSpc>
-                        <a:spcBef>
-                          <a:spcPts val="0"/>
-                        </a:spcBef>
-                        <a:spcAft>
-                          <a:spcPts val="1000"/>
-                        </a:spcAft>
-                      </a:pPr>
-                      <a:r>
-                        <a:rPr lang="en-US" sz="2400">
-                          <a:effectLst/>
-                          <a:latin typeface="Cambria"/>
-                          <a:ea typeface="ＭＳ 明朝"/>
-                          <a:cs typeface="Times New Roman"/>
-                        </a:rPr>
-                        <a:t>Metadata+LDA</a:t>
-                      </a:r>
-                    </a:p>
-                  </a:txBody>
-                  <a:tcPr marL="68580" marR="68580" marT="0" marB="0"/>
-                </a:tc>
-                <a:tc>
-                  <a:txBody>
-                    <a:bodyPr/>
-                    <a:lstStyle/>
-                    <a:p>
-                      <a:pPr marL="0" marR="0" algn="ctr">
-                        <a:lnSpc>
-                          <a:spcPct val="115000"/>
-                        </a:lnSpc>
-                        <a:spcBef>
-                          <a:spcPts val="0"/>
-                        </a:spcBef>
-                        <a:spcAft>
-                          <a:spcPts val="1000"/>
-                        </a:spcAft>
-                      </a:pPr>
-                      <a:r>
-                        <a:rPr lang="en-US" sz="2400" b="1" dirty="0">
-                          <a:effectLst/>
-                          <a:latin typeface="Cambria"/>
-                          <a:ea typeface="ＭＳ 明朝"/>
-                          <a:cs typeface="Times New Roman"/>
-                        </a:rPr>
-                        <a:t>70.4</a:t>
-                      </a:r>
-                    </a:p>
-                  </a:txBody>
-                  <a:tcPr marL="68580" marR="68580" marT="0" marB="0"/>
-                </a:tc>
-                <a:tc>
-                  <a:txBody>
-                    <a:bodyPr/>
-                    <a:lstStyle/>
-                    <a:p>
-                      <a:pPr marL="0" marR="0" algn="ctr">
-                        <a:lnSpc>
-                          <a:spcPct val="115000"/>
-                        </a:lnSpc>
-                        <a:spcBef>
-                          <a:spcPts val="0"/>
-                        </a:spcBef>
-                        <a:spcAft>
-                          <a:spcPts val="1000"/>
-                        </a:spcAft>
-                      </a:pPr>
-                      <a:r>
-                        <a:rPr lang="en-US" sz="2400" b="1" dirty="0">
-                          <a:effectLst/>
-                          <a:latin typeface="Cambria"/>
-                          <a:ea typeface="ＭＳ 明朝"/>
-                          <a:cs typeface="Times New Roman"/>
-                        </a:rPr>
-                        <a:t>66.9</a:t>
-                      </a:r>
-                    </a:p>
-                  </a:txBody>
-                  <a:tcPr marL="68580" marR="68580" marT="0" marB="0"/>
-                </a:tc>
-                <a:tc>
-                  <a:txBody>
-                    <a:bodyPr/>
-                    <a:lstStyle/>
-                    <a:p>
-                      <a:pPr marL="0" marR="0" algn="ctr">
-                        <a:lnSpc>
-                          <a:spcPct val="115000"/>
-                        </a:lnSpc>
-                        <a:spcBef>
-                          <a:spcPts val="0"/>
-                        </a:spcBef>
-                        <a:spcAft>
-                          <a:spcPts val="1000"/>
-                        </a:spcAft>
-                      </a:pPr>
-                      <a:r>
-                        <a:rPr lang="en-US" sz="2400" b="1" dirty="0">
-                          <a:effectLst/>
-                          <a:latin typeface="Cambria"/>
-                          <a:ea typeface="ＭＳ 明朝"/>
-                          <a:cs typeface="Times New Roman"/>
-                        </a:rPr>
-                        <a:t>68.6</a:t>
-                      </a:r>
-                    </a:p>
-                  </a:txBody>
-                  <a:tcPr marL="68580" marR="68580" marT="0" marB="0"/>
-                </a:tc>
-              </a:tr>
-              <a:tr h="370840">
-                <a:tc>
-                  <a:txBody>
-                    <a:bodyPr/>
-                    <a:lstStyle/>
-                    <a:p>
-                      <a:pPr marL="0" marR="0" algn="l">
-                        <a:lnSpc>
-                          <a:spcPct val="115000"/>
-                        </a:lnSpc>
-                        <a:spcBef>
-                          <a:spcPts val="0"/>
-                        </a:spcBef>
-                        <a:spcAft>
-                          <a:spcPts val="1000"/>
-                        </a:spcAft>
-                      </a:pPr>
-                      <a:r>
-                        <a:rPr lang="en-US" sz="2400">
-                          <a:effectLst/>
-                          <a:latin typeface="Cambria"/>
-                          <a:ea typeface="ＭＳ 明朝"/>
-                          <a:cs typeface="Times New Roman"/>
-                        </a:rPr>
-                        <a:t>All features</a:t>
-                      </a:r>
-                    </a:p>
-                  </a:txBody>
-                  <a:tcPr marL="68580" marR="68580" marT="0" marB="0"/>
-                </a:tc>
-                <a:tc>
-                  <a:txBody>
-                    <a:bodyPr/>
-                    <a:lstStyle/>
-                    <a:p>
-                      <a:pPr marL="0" marR="0" algn="ctr">
-                        <a:lnSpc>
-                          <a:spcPct val="115000"/>
-                        </a:lnSpc>
-                        <a:spcBef>
-                          <a:spcPts val="0"/>
-                        </a:spcBef>
-                        <a:spcAft>
-                          <a:spcPts val="1000"/>
-                        </a:spcAft>
-                      </a:pPr>
-                      <a:r>
-                        <a:rPr lang="en-US" sz="2400">
-                          <a:effectLst/>
-                          <a:latin typeface="Cambria"/>
-                          <a:ea typeface="ＭＳ 明朝"/>
-                          <a:cs typeface="Times New Roman"/>
-                        </a:rPr>
-                        <a:t>68.1</a:t>
-                      </a:r>
-                    </a:p>
-                  </a:txBody>
-                  <a:tcPr marL="68580" marR="68580" marT="0" marB="0"/>
-                </a:tc>
-                <a:tc>
-                  <a:txBody>
-                    <a:bodyPr/>
-                    <a:lstStyle/>
-                    <a:p>
-                      <a:pPr marL="0" marR="0" algn="ctr">
-                        <a:lnSpc>
-                          <a:spcPct val="115000"/>
-                        </a:lnSpc>
-                        <a:spcBef>
-                          <a:spcPts val="0"/>
-                        </a:spcBef>
-                        <a:spcAft>
-                          <a:spcPts val="1000"/>
-                        </a:spcAft>
-                      </a:pPr>
-                      <a:r>
-                        <a:rPr lang="en-US" sz="2400" dirty="0">
-                          <a:effectLst/>
-                          <a:latin typeface="Cambria"/>
-                          <a:ea typeface="ＭＳ 明朝"/>
-                          <a:cs typeface="Times New Roman"/>
-                        </a:rPr>
-                        <a:t>57.5</a:t>
-                      </a:r>
-                    </a:p>
-                  </a:txBody>
-                  <a:tcPr marL="68580" marR="68580" marT="0" marB="0"/>
-                </a:tc>
-                <a:tc>
-                  <a:txBody>
-                    <a:bodyPr/>
-                    <a:lstStyle/>
-                    <a:p>
-                      <a:pPr marL="0" marR="0" algn="ctr">
-                        <a:lnSpc>
-                          <a:spcPct val="115000"/>
-                        </a:lnSpc>
-                        <a:spcBef>
-                          <a:spcPts val="0"/>
-                        </a:spcBef>
-                        <a:spcAft>
-                          <a:spcPts val="1000"/>
-                        </a:spcAft>
-                      </a:pPr>
-                      <a:r>
-                        <a:rPr lang="en-US" sz="2400">
-                          <a:effectLst/>
-                          <a:latin typeface="Cambria"/>
-                          <a:ea typeface="ＭＳ 明朝"/>
-                          <a:cs typeface="Times New Roman"/>
-                        </a:rPr>
-                        <a:t>62.4</a:t>
-                      </a:r>
-                    </a:p>
-                  </a:txBody>
-                  <a:tcPr marL="68580" marR="68580" marT="0" marB="0"/>
-                </a:tc>
-              </a:tr>
-              <a:tr h="370840">
-                <a:tc>
-                  <a:txBody>
-                    <a:bodyPr/>
-                    <a:lstStyle/>
-                    <a:p>
-                      <a:pPr marL="0" marR="0" algn="l">
-                        <a:lnSpc>
-                          <a:spcPct val="115000"/>
-                        </a:lnSpc>
-                        <a:spcBef>
-                          <a:spcPts val="0"/>
-                        </a:spcBef>
-                        <a:spcAft>
-                          <a:spcPts val="1000"/>
-                        </a:spcAft>
-                      </a:pPr>
-                      <a:r>
-                        <a:rPr lang="en-US" sz="2400">
-                          <a:effectLst/>
-                          <a:latin typeface="Cambria"/>
-                          <a:ea typeface="ＭＳ 明朝"/>
-                          <a:cs typeface="Times New Roman"/>
-                        </a:rPr>
-                        <a:t>All Positive</a:t>
-                      </a:r>
-                    </a:p>
-                  </a:txBody>
-                  <a:tcPr marL="68580" marR="68580" marT="0" marB="0"/>
-                </a:tc>
-                <a:tc>
-                  <a:txBody>
-                    <a:bodyPr/>
-                    <a:lstStyle/>
-                    <a:p>
-                      <a:pPr marL="0" marR="0" algn="ctr">
-                        <a:lnSpc>
-                          <a:spcPct val="115000"/>
-                        </a:lnSpc>
-                        <a:spcBef>
-                          <a:spcPts val="0"/>
-                        </a:spcBef>
-                        <a:spcAft>
-                          <a:spcPts val="1000"/>
-                        </a:spcAft>
-                      </a:pPr>
-                      <a:r>
-                        <a:rPr lang="en-US" sz="2400" dirty="0">
-                          <a:effectLst/>
-                          <a:latin typeface="Cambria"/>
-                          <a:ea typeface="ＭＳ 明朝"/>
-                          <a:cs typeface="Times New Roman"/>
-                        </a:rPr>
-                        <a:t>0.35</a:t>
-                      </a:r>
-                    </a:p>
-                  </a:txBody>
-                  <a:tcPr marL="68580" marR="68580" marT="0" marB="0"/>
-                </a:tc>
-                <a:tc>
-                  <a:txBody>
-                    <a:bodyPr/>
-                    <a:lstStyle/>
-                    <a:p>
-                      <a:pPr marL="0" marR="0" algn="ctr">
-                        <a:lnSpc>
-                          <a:spcPct val="115000"/>
-                        </a:lnSpc>
-                        <a:spcBef>
-                          <a:spcPts val="0"/>
-                        </a:spcBef>
-                        <a:spcAft>
-                          <a:spcPts val="1000"/>
-                        </a:spcAft>
-                      </a:pPr>
-                      <a:r>
-                        <a:rPr lang="en-US" sz="2400" dirty="0">
-                          <a:effectLst/>
-                          <a:latin typeface="Cambria"/>
-                          <a:ea typeface="ＭＳ 明朝"/>
-                          <a:cs typeface="Times New Roman"/>
-                        </a:rPr>
-                        <a:t>100.0</a:t>
-                      </a:r>
-                    </a:p>
-                  </a:txBody>
-                  <a:tcPr marL="68580" marR="68580" marT="0" marB="0"/>
-                </a:tc>
-                <a:tc>
-                  <a:txBody>
-                    <a:bodyPr/>
-                    <a:lstStyle/>
-                    <a:p>
-                      <a:pPr marL="0" marR="0" algn="ctr">
-                        <a:lnSpc>
-                          <a:spcPct val="115000"/>
-                        </a:lnSpc>
-                        <a:spcBef>
-                          <a:spcPts val="0"/>
-                        </a:spcBef>
-                        <a:spcAft>
-                          <a:spcPts val="1000"/>
-                        </a:spcAft>
-                      </a:pPr>
-                      <a:r>
-                        <a:rPr lang="en-US" sz="2400" dirty="0" smtClean="0">
-                          <a:effectLst/>
-                          <a:latin typeface="Cambria"/>
-                          <a:ea typeface="ＭＳ 明朝"/>
-                          <a:cs typeface="Times New Roman"/>
-                        </a:rPr>
-                        <a:t>51.9</a:t>
-                      </a:r>
-                      <a:endParaRPr lang="en-US" sz="2400" dirty="0">
-                        <a:effectLst/>
-                        <a:latin typeface="Cambria"/>
-                        <a:ea typeface="ＭＳ 明朝"/>
-                        <a:cs typeface="Times New Roman"/>
-                      </a:endParaRPr>
-                    </a:p>
-                  </a:txBody>
-                  <a:tcPr marL="68580" marR="68580" marT="0" marB="0"/>
-                </a:tc>
-              </a:tr>
-            </a:tbl>
-          </a:graphicData>
-        </a:graphic>
-      </p:graphicFrame>
-      <p:graphicFrame>
-        <p:nvGraphicFramePr>
-          <p:cNvPr id="7" name="Table 6"/>
-          <p:cNvGraphicFramePr>
-            <a:graphicFrameLocks noGrp="1"/>
-          </p:cNvGraphicFramePr>
-          <p:nvPr>
-            <p:extLst>
-              <p:ext uri="{D42A27DB-BD31-4B8C-83A1-F6EECF244321}">
-                <p14:modId xmlns:p14="http://schemas.microsoft.com/office/powerpoint/2010/main" val="1278740302"/>
-              </p:ext>
-            </p:extLst>
-          </p:nvPr>
-        </p:nvGraphicFramePr>
-        <p:xfrm>
-          <a:off x="609600" y="4648200"/>
-          <a:ext cx="8001000" cy="1682496"/>
-        </p:xfrm>
-        <a:graphic>
-          <a:graphicData uri="http://schemas.openxmlformats.org/drawingml/2006/table">
-            <a:tbl>
-              <a:tblPr firstRow="1" bandRow="1">
-                <a:tableStyleId>{5C22544A-7EE6-4342-B048-85BDC9FD1C3A}</a:tableStyleId>
-              </a:tblPr>
-              <a:tblGrid>
-                <a:gridCol w="2133600"/>
-                <a:gridCol w="1866900"/>
-                <a:gridCol w="2000250"/>
-                <a:gridCol w="2000250"/>
-              </a:tblGrid>
-              <a:tr h="370840">
-                <a:tc>
-                  <a:txBody>
-                    <a:bodyPr/>
-                    <a:lstStyle/>
-                    <a:p>
-                      <a:pPr marL="0" marR="0" algn="l">
-                        <a:lnSpc>
-                          <a:spcPct val="115000"/>
-                        </a:lnSpc>
-                        <a:spcBef>
-                          <a:spcPts val="0"/>
-                        </a:spcBef>
-                        <a:spcAft>
-                          <a:spcPts val="1000"/>
-                        </a:spcAft>
-                      </a:pPr>
-                      <a:r>
-                        <a:rPr lang="en-US" sz="2400" dirty="0">
-                          <a:effectLst/>
-                          <a:latin typeface="Cambria"/>
-                          <a:ea typeface="ＭＳ 明朝"/>
-                          <a:cs typeface="Times New Roman"/>
-                        </a:rPr>
-                        <a:t> </a:t>
-                      </a:r>
-                    </a:p>
-                  </a:txBody>
-                  <a:tcPr marL="68580" marR="68580" marT="0" marB="0"/>
-                </a:tc>
-                <a:tc>
-                  <a:txBody>
-                    <a:bodyPr/>
-                    <a:lstStyle/>
-                    <a:p>
-                      <a:pPr marL="0" marR="0" algn="ctr">
-                        <a:lnSpc>
-                          <a:spcPct val="115000"/>
-                        </a:lnSpc>
-                        <a:spcBef>
-                          <a:spcPts val="0"/>
-                        </a:spcBef>
-                        <a:spcAft>
-                          <a:spcPts val="1000"/>
-                        </a:spcAft>
-                      </a:pPr>
-                      <a:r>
-                        <a:rPr lang="en-US" sz="2400" b="1">
-                          <a:effectLst/>
-                          <a:latin typeface="Cambria"/>
-                          <a:ea typeface="ＭＳ 明朝"/>
-                          <a:cs typeface="Times New Roman"/>
-                        </a:rPr>
-                        <a:t>Precision</a:t>
-                      </a:r>
-                      <a:endParaRPr lang="en-US" sz="2400">
-                        <a:effectLst/>
-                        <a:latin typeface="Cambria"/>
-                        <a:ea typeface="ＭＳ 明朝"/>
-                        <a:cs typeface="Times New Roman"/>
-                      </a:endParaRPr>
-                    </a:p>
-                  </a:txBody>
-                  <a:tcPr marL="68580" marR="68580" marT="0" marB="0"/>
-                </a:tc>
-                <a:tc>
-                  <a:txBody>
-                    <a:bodyPr/>
-                    <a:lstStyle/>
-                    <a:p>
-                      <a:pPr marL="0" marR="0" algn="ctr">
-                        <a:lnSpc>
-                          <a:spcPct val="115000"/>
-                        </a:lnSpc>
-                        <a:spcBef>
-                          <a:spcPts val="0"/>
-                        </a:spcBef>
-                        <a:spcAft>
-                          <a:spcPts val="1000"/>
-                        </a:spcAft>
-                      </a:pPr>
-                      <a:r>
-                        <a:rPr lang="en-US" sz="2400" b="1">
-                          <a:effectLst/>
-                          <a:latin typeface="Cambria"/>
-                          <a:ea typeface="ＭＳ 明朝"/>
-                          <a:cs typeface="Times New Roman"/>
-                        </a:rPr>
-                        <a:t>Recall</a:t>
-                      </a:r>
-                      <a:endParaRPr lang="en-US" sz="2400">
-                        <a:effectLst/>
-                        <a:latin typeface="Cambria"/>
-                        <a:ea typeface="ＭＳ 明朝"/>
-                        <a:cs typeface="Times New Roman"/>
-                      </a:endParaRPr>
-                    </a:p>
-                  </a:txBody>
-                  <a:tcPr marL="68580" marR="68580" marT="0" marB="0"/>
-                </a:tc>
-                <a:tc>
-                  <a:txBody>
-                    <a:bodyPr/>
-                    <a:lstStyle/>
-                    <a:p>
-                      <a:pPr marL="0" marR="0" algn="ctr">
-                        <a:lnSpc>
-                          <a:spcPct val="115000"/>
-                        </a:lnSpc>
-                        <a:spcBef>
-                          <a:spcPts val="0"/>
-                        </a:spcBef>
-                        <a:spcAft>
-                          <a:spcPts val="1000"/>
-                        </a:spcAft>
-                      </a:pPr>
-                      <a:r>
-                        <a:rPr lang="en-US" sz="2400" b="1">
-                          <a:effectLst/>
-                          <a:latin typeface="Cambria"/>
-                          <a:ea typeface="ＭＳ 明朝"/>
-                          <a:cs typeface="Times New Roman"/>
-                        </a:rPr>
-                        <a:t>F-score</a:t>
-                      </a:r>
-                      <a:endParaRPr lang="en-US" sz="2400">
-                        <a:effectLst/>
-                        <a:latin typeface="Cambria"/>
-                        <a:ea typeface="ＭＳ 明朝"/>
-                        <a:cs typeface="Times New Roman"/>
-                      </a:endParaRPr>
-                    </a:p>
-                  </a:txBody>
-                  <a:tcPr marL="68580" marR="68580" marT="0" marB="0"/>
-                </a:tc>
-              </a:tr>
-              <a:tr h="370840">
-                <a:tc>
-                  <a:txBody>
-                    <a:bodyPr/>
-                    <a:lstStyle/>
-                    <a:p>
-                      <a:pPr marL="0" marR="0" algn="l">
-                        <a:lnSpc>
-                          <a:spcPct val="115000"/>
-                        </a:lnSpc>
-                        <a:spcBef>
-                          <a:spcPts val="0"/>
-                        </a:spcBef>
-                        <a:spcAft>
-                          <a:spcPts val="1000"/>
-                        </a:spcAft>
-                      </a:pPr>
-                      <a:r>
-                        <a:rPr lang="en-US" sz="2400">
-                          <a:effectLst/>
-                          <a:latin typeface="Cambria"/>
-                          <a:ea typeface="ＭＳ 明朝"/>
-                          <a:cs typeface="Times New Roman"/>
-                        </a:rPr>
-                        <a:t>Metadata+LDA</a:t>
-                      </a:r>
-                    </a:p>
-                  </a:txBody>
-                  <a:tcPr marL="68580" marR="68580" marT="0" marB="0"/>
-                </a:tc>
-                <a:tc>
-                  <a:txBody>
-                    <a:bodyPr/>
-                    <a:lstStyle/>
-                    <a:p>
-                      <a:pPr marL="0" marR="0" algn="ctr">
-                        <a:lnSpc>
-                          <a:spcPct val="115000"/>
-                        </a:lnSpc>
-                        <a:spcBef>
-                          <a:spcPts val="0"/>
-                        </a:spcBef>
-                        <a:spcAft>
-                          <a:spcPts val="1000"/>
-                        </a:spcAft>
-                      </a:pPr>
-                      <a:r>
-                        <a:rPr lang="en-US" sz="2400" dirty="0">
-                          <a:effectLst/>
-                          <a:latin typeface="Cambria"/>
-                          <a:ea typeface="ＭＳ 明朝"/>
-                          <a:cs typeface="Times New Roman"/>
-                        </a:rPr>
-                        <a:t>51.0</a:t>
-                      </a:r>
-                    </a:p>
-                  </a:txBody>
-                  <a:tcPr marL="68580" marR="68580" marT="0" marB="0"/>
-                </a:tc>
-                <a:tc>
-                  <a:txBody>
-                    <a:bodyPr/>
-                    <a:lstStyle/>
-                    <a:p>
-                      <a:pPr marL="0" marR="0" algn="ctr">
-                        <a:lnSpc>
-                          <a:spcPct val="115000"/>
-                        </a:lnSpc>
-                        <a:spcBef>
-                          <a:spcPts val="0"/>
-                        </a:spcBef>
-                        <a:spcAft>
-                          <a:spcPts val="1000"/>
-                        </a:spcAft>
-                      </a:pPr>
-                      <a:r>
-                        <a:rPr lang="en-US" sz="2400" b="1" dirty="0">
-                          <a:effectLst/>
-                          <a:latin typeface="Cambria"/>
-                          <a:ea typeface="ＭＳ 明朝"/>
-                          <a:cs typeface="Times New Roman"/>
-                        </a:rPr>
-                        <a:t>55.6</a:t>
-                      </a:r>
-                    </a:p>
-                  </a:txBody>
-                  <a:tcPr marL="68580" marR="68580" marT="0" marB="0"/>
-                </a:tc>
-                <a:tc>
-                  <a:txBody>
-                    <a:bodyPr/>
-                    <a:lstStyle/>
-                    <a:p>
-                      <a:pPr marL="0" marR="0" algn="ctr">
-                        <a:lnSpc>
-                          <a:spcPct val="115000"/>
-                        </a:lnSpc>
-                        <a:spcBef>
-                          <a:spcPts val="0"/>
-                        </a:spcBef>
-                        <a:spcAft>
-                          <a:spcPts val="1000"/>
-                        </a:spcAft>
-                      </a:pPr>
-                      <a:r>
-                        <a:rPr lang="en-US" sz="2400" b="1" dirty="0">
-                          <a:effectLst/>
-                          <a:latin typeface="Cambria"/>
-                          <a:ea typeface="ＭＳ 明朝"/>
-                          <a:cs typeface="Times New Roman"/>
-                        </a:rPr>
-                        <a:t>53.1</a:t>
-                      </a:r>
-                    </a:p>
-                  </a:txBody>
-                  <a:tcPr marL="68580" marR="68580" marT="0" marB="0"/>
-                </a:tc>
-              </a:tr>
-              <a:tr h="370840">
-                <a:tc>
-                  <a:txBody>
-                    <a:bodyPr/>
-                    <a:lstStyle/>
-                    <a:p>
-                      <a:pPr marL="0" marR="0" algn="l">
-                        <a:lnSpc>
-                          <a:spcPct val="115000"/>
-                        </a:lnSpc>
-                        <a:spcBef>
-                          <a:spcPts val="0"/>
-                        </a:spcBef>
-                        <a:spcAft>
-                          <a:spcPts val="1000"/>
-                        </a:spcAft>
-                      </a:pPr>
-                      <a:r>
-                        <a:rPr lang="en-US" sz="2400" dirty="0">
-                          <a:effectLst/>
-                          <a:latin typeface="Cambria"/>
-                          <a:ea typeface="ＭＳ 明朝"/>
-                          <a:cs typeface="Times New Roman"/>
-                        </a:rPr>
-                        <a:t>All features</a:t>
-                      </a:r>
-                    </a:p>
-                  </a:txBody>
-                  <a:tcPr marL="68580" marR="68580" marT="0" marB="0"/>
-                </a:tc>
-                <a:tc>
-                  <a:txBody>
-                    <a:bodyPr/>
-                    <a:lstStyle/>
-                    <a:p>
-                      <a:pPr marL="0" marR="0" algn="ctr">
-                        <a:lnSpc>
-                          <a:spcPct val="115000"/>
-                        </a:lnSpc>
-                        <a:spcBef>
-                          <a:spcPts val="0"/>
-                        </a:spcBef>
-                        <a:spcAft>
-                          <a:spcPts val="1000"/>
-                        </a:spcAft>
-                      </a:pPr>
-                      <a:r>
-                        <a:rPr lang="en-US" sz="2400" b="1" dirty="0">
-                          <a:effectLst/>
-                          <a:latin typeface="Cambria"/>
-                          <a:ea typeface="ＭＳ 明朝"/>
-                          <a:cs typeface="Times New Roman"/>
-                        </a:rPr>
-                        <a:t>54.4</a:t>
-                      </a:r>
-                    </a:p>
-                  </a:txBody>
-                  <a:tcPr marL="68580" marR="68580" marT="0" marB="0"/>
-                </a:tc>
-                <a:tc>
-                  <a:txBody>
-                    <a:bodyPr/>
-                    <a:lstStyle/>
-                    <a:p>
-                      <a:pPr marL="0" marR="0" algn="ctr">
-                        <a:lnSpc>
-                          <a:spcPct val="115000"/>
-                        </a:lnSpc>
-                        <a:spcBef>
-                          <a:spcPts val="0"/>
-                        </a:spcBef>
-                        <a:spcAft>
-                          <a:spcPts val="1000"/>
-                        </a:spcAft>
-                      </a:pPr>
-                      <a:r>
-                        <a:rPr lang="en-US" sz="2400" dirty="0">
-                          <a:effectLst/>
-                          <a:latin typeface="Cambria"/>
-                          <a:ea typeface="ＭＳ 明朝"/>
-                          <a:cs typeface="Times New Roman"/>
-                        </a:rPr>
-                        <a:t>50.5</a:t>
-                      </a:r>
-                    </a:p>
-                  </a:txBody>
-                  <a:tcPr marL="68580" marR="68580" marT="0" marB="0"/>
-                </a:tc>
-                <a:tc>
-                  <a:txBody>
-                    <a:bodyPr/>
-                    <a:lstStyle/>
-                    <a:p>
-                      <a:pPr marL="0" marR="0" algn="ctr">
-                        <a:lnSpc>
-                          <a:spcPct val="115000"/>
-                        </a:lnSpc>
-                        <a:spcBef>
-                          <a:spcPts val="0"/>
-                        </a:spcBef>
-                        <a:spcAft>
-                          <a:spcPts val="1000"/>
-                        </a:spcAft>
-                      </a:pPr>
-                      <a:r>
-                        <a:rPr lang="en-US" sz="2400" dirty="0">
-                          <a:effectLst/>
-                          <a:latin typeface="Cambria"/>
-                          <a:ea typeface="ＭＳ 明朝"/>
-                          <a:cs typeface="Times New Roman"/>
-                        </a:rPr>
-                        <a:t>52.3</a:t>
-                      </a:r>
-                    </a:p>
-                  </a:txBody>
-                  <a:tcPr marL="68580" marR="68580" marT="0" marB="0"/>
-                </a:tc>
-              </a:tr>
-              <a:tr h="370840">
-                <a:tc>
-                  <a:txBody>
-                    <a:bodyPr/>
-                    <a:lstStyle/>
-                    <a:p>
-                      <a:pPr marL="0" marR="0" algn="l">
-                        <a:lnSpc>
-                          <a:spcPct val="115000"/>
-                        </a:lnSpc>
-                        <a:spcBef>
-                          <a:spcPts val="0"/>
-                        </a:spcBef>
-                        <a:spcAft>
-                          <a:spcPts val="1000"/>
-                        </a:spcAft>
-                      </a:pPr>
-                      <a:r>
-                        <a:rPr lang="en-US" sz="2400">
-                          <a:effectLst/>
-                          <a:latin typeface="Cambria"/>
-                          <a:ea typeface="ＭＳ 明朝"/>
-                          <a:cs typeface="Times New Roman"/>
-                        </a:rPr>
-                        <a:t>All Positive</a:t>
-                      </a:r>
-                    </a:p>
-                  </a:txBody>
-                  <a:tcPr marL="68580" marR="68580" marT="0" marB="0"/>
-                </a:tc>
-                <a:tc>
-                  <a:txBody>
-                    <a:bodyPr/>
-                    <a:lstStyle/>
-                    <a:p>
-                      <a:pPr marL="0" marR="0" algn="ctr">
-                        <a:lnSpc>
-                          <a:spcPct val="115000"/>
-                        </a:lnSpc>
-                        <a:spcBef>
-                          <a:spcPts val="0"/>
-                        </a:spcBef>
-                        <a:spcAft>
-                          <a:spcPts val="1000"/>
-                        </a:spcAft>
-                      </a:pPr>
-                      <a:r>
-                        <a:rPr lang="en-US" sz="2400">
-                          <a:effectLst/>
-                          <a:latin typeface="Cambria"/>
-                          <a:ea typeface="ＭＳ 明朝"/>
-                          <a:cs typeface="Times New Roman"/>
-                        </a:rPr>
-                        <a:t>27.0</a:t>
-                      </a:r>
-                    </a:p>
-                  </a:txBody>
-                  <a:tcPr marL="68580" marR="68580" marT="0" marB="0"/>
-                </a:tc>
-                <a:tc>
-                  <a:txBody>
-                    <a:bodyPr/>
-                    <a:lstStyle/>
-                    <a:p>
-                      <a:pPr marL="0" marR="0" algn="ctr">
-                        <a:lnSpc>
-                          <a:spcPct val="115000"/>
-                        </a:lnSpc>
-                        <a:spcBef>
-                          <a:spcPts val="0"/>
-                        </a:spcBef>
-                        <a:spcAft>
-                          <a:spcPts val="1000"/>
-                        </a:spcAft>
-                      </a:pPr>
-                      <a:r>
-                        <a:rPr lang="en-US" sz="2400">
-                          <a:effectLst/>
-                          <a:latin typeface="Cambria"/>
-                          <a:ea typeface="ＭＳ 明朝"/>
-                          <a:cs typeface="Times New Roman"/>
-                        </a:rPr>
-                        <a:t>100.0</a:t>
-                      </a:r>
-                    </a:p>
-                  </a:txBody>
-                  <a:tcPr marL="68580" marR="68580" marT="0" marB="0"/>
-                </a:tc>
-                <a:tc>
-                  <a:txBody>
-                    <a:bodyPr/>
-                    <a:lstStyle/>
-                    <a:p>
-                      <a:pPr marL="0" marR="0" algn="ctr">
-                        <a:lnSpc>
-                          <a:spcPct val="115000"/>
-                        </a:lnSpc>
-                        <a:spcBef>
-                          <a:spcPts val="0"/>
-                        </a:spcBef>
-                        <a:spcAft>
-                          <a:spcPts val="1000"/>
-                        </a:spcAft>
-                      </a:pPr>
-                      <a:r>
-                        <a:rPr lang="en-US" sz="2400" dirty="0">
-                          <a:effectLst/>
-                          <a:latin typeface="Cambria"/>
-                          <a:ea typeface="ＭＳ 明朝"/>
-                          <a:cs typeface="Times New Roman"/>
-                        </a:rPr>
-                        <a:t>42.5</a:t>
-                      </a:r>
-                    </a:p>
-                  </a:txBody>
-                  <a:tcPr marL="68580" marR="68580" marT="0" marB="0"/>
-                </a:tc>
-              </a:tr>
-            </a:tbl>
-          </a:graphicData>
-        </a:graphic>
-      </p:graphicFrame>
+        </p:txBody>
+      </p:sp>
     </p:spTree>
   </p:cSld>
   <p:clrMapOvr>
@@ -7698,7 +7616,7 @@
   <p:timing>
     <p:tnLst>
       <p:par>
-        <p:cTn xmlns:p14="http://schemas.microsoft.com/office/powerpoint/2010/main" id="1" dur="indefinite" restart="never" nodeType="tmRoot"/>
+        <p:cTn id="1" dur="indefinite" restart="never" nodeType="tmRoot"/>
       </p:par>
     </p:tnLst>
   </p:timing>

</xml_diff>

<commit_message>
fixed a typo "0.35" -> "35.0"
</commit_message>
<xml_diff>
--- a/project_presentation.pptx
+++ b/project_presentation.pptx
@@ -374,7 +374,7 @@
     </p:spTree>
     <p:extLst>
       <p:ext uri="{BB962C8B-B14F-4D97-AF65-F5344CB8AC3E}">
-        <p14:creationId xmlns:p14="http://schemas.microsoft.com/office/powerpoint/2010/main" xmlns="" val="2985717041"/>
+        <p14:creationId xmlns="" xmlns:p14="http://schemas.microsoft.com/office/powerpoint/2010/main" val="2985717041"/>
       </p:ext>
     </p:extLst>
   </p:cSld>
@@ -3866,7 +3866,7 @@
     </p:spTree>
     <p:extLst>
       <p:ext uri="{BB962C8B-B14F-4D97-AF65-F5344CB8AC3E}">
-        <p14:creationId xmlns:p14="http://schemas.microsoft.com/office/powerpoint/2010/main" xmlns="" val="1491979582"/>
+        <p14:creationId xmlns="" xmlns:p14="http://schemas.microsoft.com/office/powerpoint/2010/main" val="1491979582"/>
       </p:ext>
     </p:extLst>
   </p:cSld>
@@ -4462,7 +4462,7 @@
           <p:nvPr>
             <p:extLst>
               <p:ext uri="{D42A27DB-BD31-4B8C-83A1-F6EECF244321}">
-                <p14:modId xmlns:p14="http://schemas.microsoft.com/office/powerpoint/2010/main" xmlns="" val="3173376732"/>
+                <p14:modId xmlns="" xmlns:p14="http://schemas.microsoft.com/office/powerpoint/2010/main" val="3173376732"/>
               </p:ext>
             </p:extLst>
           </p:nvPr>
@@ -4849,15 +4849,7 @@
             <a:pPr algn="l"/>
             <a:r>
               <a:rPr lang="en-US" dirty="0" smtClean="0"/>
-              <a:t>Evaluation (ACL 2012</a:t>
-            </a:r>
-            <a:r>
-              <a:rPr lang="en-US" dirty="0" smtClean="0"/>
-              <a:t>) </a:t>
-            </a:r>
-            <a:r>
-              <a:rPr lang="en-US" dirty="0" smtClean="0"/>
-              <a:t>– SVM</a:t>
+              <a:t>Evaluation (ACL 2012) – SVM</a:t>
             </a:r>
             <a:endParaRPr lang="en-US" dirty="0"/>
           </a:p>
@@ -4873,7 +4865,7 @@
             <p:ph idx="1"/>
             <p:extLst>
               <p:ext uri="{D42A27DB-BD31-4B8C-83A1-F6EECF244321}">
-                <p14:modId xmlns:p14="http://schemas.microsoft.com/office/powerpoint/2010/main" xmlns="" val="2884715640"/>
+                <p14:modId xmlns="" xmlns:p14="http://schemas.microsoft.com/office/powerpoint/2010/main" val="2884715640"/>
               </p:ext>
             </p:extLst>
           </p:nvPr>
@@ -6464,7 +6456,7 @@
           <p:nvPr>
             <p:extLst>
               <p:ext uri="{D42A27DB-BD31-4B8C-83A1-F6EECF244321}">
-                <p14:modId xmlns:p14="http://schemas.microsoft.com/office/powerpoint/2010/main" xmlns="" val="1303962632"/>
+                <p14:modId xmlns="" xmlns:p14="http://schemas.microsoft.com/office/powerpoint/2010/main" val="1303962632"/>
               </p:ext>
             </p:extLst>
           </p:nvPr>
@@ -6904,14 +6896,20 @@
                         </a:spcAft>
                       </a:pPr>
                       <a:r>
-                        <a:rPr lang="en-US" sz="2400" dirty="0">
+                        <a:rPr lang="en-US" sz="2400" smtClean="0">
                           <a:effectLst/>
                           <a:latin typeface="Cambria"/>
                           <a:ea typeface="ＭＳ 明朝"/>
                           <a:cs typeface="Times New Roman"/>
                         </a:rPr>
-                        <a:t>0.35</a:t>
-                      </a:r>
+                        <a:t>35.0</a:t>
+                      </a:r>
+                      <a:endParaRPr lang="en-US" sz="2400" dirty="0">
+                        <a:effectLst/>
+                        <a:latin typeface="Cambria"/>
+                        <a:ea typeface="ＭＳ 明朝"/>
+                        <a:cs typeface="Times New Roman"/>
+                      </a:endParaRPr>
                     </a:p>
                   </a:txBody>
                   <a:tcPr marL="68580" marR="68580" marT="0" marB="0"/>
@@ -6994,7 +6992,7 @@
           <p:nvPr>
             <p:extLst>
               <p:ext uri="{D42A27DB-BD31-4B8C-83A1-F6EECF244321}">
-                <p14:modId xmlns:p14="http://schemas.microsoft.com/office/powerpoint/2010/main" xmlns="" val="1278740302"/>
+                <p14:modId xmlns="" xmlns:p14="http://schemas.microsoft.com/office/powerpoint/2010/main" val="1278740302"/>
               </p:ext>
             </p:extLst>
           </p:nvPr>

</xml_diff>